<commit_message>
include woz1 use case, ppt, images
</commit_message>
<xml_diff>
--- a/download/woz1.pptx
+++ b/download/woz1.pptx
@@ -16,12 +16,11 @@
     <p:sldId id="266" r:id="rId10"/>
     <p:sldId id="267" r:id="rId11"/>
     <p:sldId id="268" r:id="rId12"/>
-    <p:sldId id="269" r:id="rId13"/>
-    <p:sldId id="264" r:id="rId14"/>
-    <p:sldId id="265" r:id="rId15"/>
-    <p:sldId id="270" r:id="rId16"/>
-    <p:sldId id="271" r:id="rId17"/>
-    <p:sldId id="272" r:id="rId18"/>
+    <p:sldId id="273" r:id="rId13"/>
+    <p:sldId id="265" r:id="rId14"/>
+    <p:sldId id="270" r:id="rId15"/>
+    <p:sldId id="271" r:id="rId16"/>
+    <p:sldId id="272" r:id="rId17"/>
   </p:sldIdLst>
   <p:sldSz cx="9144000" cy="6858000" type="screen4x3"/>
   <p:notesSz cx="6858000" cy="9144000"/>
@@ -304,7 +303,7 @@
           <a:p>
             <a:fld id="{A3A84A55-A351-7044-9E3F-7F3F12E550C1}" type="datetimeFigureOut">
               <a:rPr lang="en-US" smtClean="0"/>
-              <a:t>2/14/12</a:t>
+              <a:t>2/17/2012</a:t>
             </a:fld>
             <a:endParaRPr lang="en-US"/>
           </a:p>
@@ -474,7 +473,7 @@
           <a:p>
             <a:fld id="{A3A84A55-A351-7044-9E3F-7F3F12E550C1}" type="datetimeFigureOut">
               <a:rPr lang="en-US" smtClean="0"/>
-              <a:t>2/14/12</a:t>
+              <a:t>2/17/2012</a:t>
             </a:fld>
             <a:endParaRPr lang="en-US"/>
           </a:p>
@@ -654,7 +653,7 @@
           <a:p>
             <a:fld id="{A3A84A55-A351-7044-9E3F-7F3F12E550C1}" type="datetimeFigureOut">
               <a:rPr lang="en-US" smtClean="0"/>
-              <a:t>2/14/12</a:t>
+              <a:t>2/17/2012</a:t>
             </a:fld>
             <a:endParaRPr lang="en-US"/>
           </a:p>
@@ -824,7 +823,7 @@
           <a:p>
             <a:fld id="{A3A84A55-A351-7044-9E3F-7F3F12E550C1}" type="datetimeFigureOut">
               <a:rPr lang="en-US" smtClean="0"/>
-              <a:t>2/14/12</a:t>
+              <a:t>2/17/2012</a:t>
             </a:fld>
             <a:endParaRPr lang="en-US"/>
           </a:p>
@@ -1070,7 +1069,7 @@
           <a:p>
             <a:fld id="{A3A84A55-A351-7044-9E3F-7F3F12E550C1}" type="datetimeFigureOut">
               <a:rPr lang="en-US" smtClean="0"/>
-              <a:t>2/14/12</a:t>
+              <a:t>2/17/2012</a:t>
             </a:fld>
             <a:endParaRPr lang="en-US"/>
           </a:p>
@@ -1358,7 +1357,7 @@
           <a:p>
             <a:fld id="{A3A84A55-A351-7044-9E3F-7F3F12E550C1}" type="datetimeFigureOut">
               <a:rPr lang="en-US" smtClean="0"/>
-              <a:t>2/14/12</a:t>
+              <a:t>2/17/2012</a:t>
             </a:fld>
             <a:endParaRPr lang="en-US"/>
           </a:p>
@@ -1780,7 +1779,7 @@
           <a:p>
             <a:fld id="{A3A84A55-A351-7044-9E3F-7F3F12E550C1}" type="datetimeFigureOut">
               <a:rPr lang="en-US" smtClean="0"/>
-              <a:t>2/14/12</a:t>
+              <a:t>2/17/2012</a:t>
             </a:fld>
             <a:endParaRPr lang="en-US"/>
           </a:p>
@@ -1898,7 +1897,7 @@
           <a:p>
             <a:fld id="{A3A84A55-A351-7044-9E3F-7F3F12E550C1}" type="datetimeFigureOut">
               <a:rPr lang="en-US" smtClean="0"/>
-              <a:t>2/14/12</a:t>
+              <a:t>2/17/2012</a:t>
             </a:fld>
             <a:endParaRPr lang="en-US"/>
           </a:p>
@@ -1993,7 +1992,7 @@
           <a:p>
             <a:fld id="{A3A84A55-A351-7044-9E3F-7F3F12E550C1}" type="datetimeFigureOut">
               <a:rPr lang="en-US" smtClean="0"/>
-              <a:t>2/14/12</a:t>
+              <a:t>2/17/2012</a:t>
             </a:fld>
             <a:endParaRPr lang="en-US"/>
           </a:p>
@@ -2270,7 +2269,7 @@
           <a:p>
             <a:fld id="{A3A84A55-A351-7044-9E3F-7F3F12E550C1}" type="datetimeFigureOut">
               <a:rPr lang="en-US" smtClean="0"/>
-              <a:t>2/14/12</a:t>
+              <a:t>2/17/2012</a:t>
             </a:fld>
             <a:endParaRPr lang="en-US"/>
           </a:p>
@@ -2523,7 +2522,7 @@
           <a:p>
             <a:fld id="{A3A84A55-A351-7044-9E3F-7F3F12E550C1}" type="datetimeFigureOut">
               <a:rPr lang="en-US" smtClean="0"/>
-              <a:t>2/14/12</a:t>
+              <a:t>2/17/2012</a:t>
             </a:fld>
             <a:endParaRPr lang="en-US"/>
           </a:p>
@@ -2736,7 +2735,7 @@
           <a:p>
             <a:fld id="{A3A84A55-A351-7044-9E3F-7F3F12E550C1}" type="datetimeFigureOut">
               <a:rPr lang="en-US" smtClean="0"/>
-              <a:t>2/14/12</a:t>
+              <a:t>2/17/2012</a:t>
             </a:fld>
             <a:endParaRPr lang="en-US"/>
           </a:p>
@@ -3184,7 +3183,7 @@
   <p:timing>
     <p:tnLst>
       <p:par>
-        <p:cTn xmlns:p14="http://schemas.microsoft.com/office/powerpoint/2010/main" id="1" dur="indefinite" restart="never" nodeType="tmRoot"/>
+        <p:cTn id="1" dur="indefinite" restart="never" nodeType="tmRoot"/>
       </p:par>
     </p:tnLst>
   </p:timing>
@@ -3281,7 +3280,7 @@
   <p:timing>
     <p:tnLst>
       <p:par>
-        <p:cTn xmlns:p14="http://schemas.microsoft.com/office/powerpoint/2010/main" id="1" dur="indefinite" restart="never" nodeType="tmRoot"/>
+        <p:cTn id="1" dur="indefinite" restart="never" nodeType="tmRoot"/>
       </p:par>
     </p:tnLst>
   </p:timing>
@@ -3431,7 +3430,7 @@
   <p:timing>
     <p:tnLst>
       <p:par>
-        <p:cTn xmlns:p14="http://schemas.microsoft.com/office/powerpoint/2010/main" id="1" dur="indefinite" restart="never" nodeType="tmRoot"/>
+        <p:cTn id="1" dur="indefinite" restart="never" nodeType="tmRoot"/>
       </p:par>
     </p:tnLst>
   </p:timing>
@@ -3487,14 +3486,657 @@
       </p:pic>
       <p:sp>
         <p:nvSpPr>
-          <p:cNvPr id="106" name="Rounded Rectangle 105"/>
-          <p:cNvSpPr/>
-          <p:nvPr/>
-        </p:nvSpPr>
-        <p:spPr>
-          <a:xfrm>
-            <a:off x="1076471" y="1769591"/>
-            <a:ext cx="1778000" cy="1009812"/>
+          <p:cNvPr id="2" name="Rounded Rectangle 1"/>
+          <p:cNvSpPr/>
+          <p:nvPr/>
+        </p:nvSpPr>
+        <p:spPr>
+          <a:xfrm>
+            <a:off x="1209524" y="934720"/>
+            <a:ext cx="1839745" cy="497840"/>
+          </a:xfrm>
+          <a:prstGeom prst="roundRect">
+            <a:avLst/>
+          </a:prstGeom>
+        </p:spPr>
+        <p:style>
+          <a:lnRef idx="1">
+            <a:schemeClr val="accent1"/>
+          </a:lnRef>
+          <a:fillRef idx="3">
+            <a:schemeClr val="accent1"/>
+          </a:fillRef>
+          <a:effectRef idx="2">
+            <a:schemeClr val="accent1"/>
+          </a:effectRef>
+          <a:fontRef idx="minor">
+            <a:schemeClr val="lt1"/>
+          </a:fontRef>
+        </p:style>
+        <p:txBody>
+          <a:bodyPr rtlCol="0" anchor="ctr"/>
+          <a:lstStyle/>
+          <a:p>
+            <a:pPr algn="ctr"/>
+            <a:r>
+              <a:rPr lang="en-US" dirty="0" smtClean="0"/>
+              <a:t>Comedy</a:t>
+            </a:r>
+            <a:endParaRPr lang="en-US" dirty="0"/>
+          </a:p>
+        </p:txBody>
+      </p:sp>
+      <p:sp>
+        <p:nvSpPr>
+          <p:cNvPr id="13" name="Left Arrow 12"/>
+          <p:cNvSpPr/>
+          <p:nvPr/>
+        </p:nvSpPr>
+        <p:spPr>
+          <a:xfrm flipH="1">
+            <a:off x="8129270" y="1910080"/>
+            <a:ext cx="274017" cy="2621280"/>
+          </a:xfrm>
+          <a:prstGeom prst="leftArrow">
+            <a:avLst>
+              <a:gd name="adj1" fmla="val 49758"/>
+              <a:gd name="adj2" fmla="val 75000"/>
+            </a:avLst>
+          </a:prstGeom>
+        </p:spPr>
+        <p:style>
+          <a:lnRef idx="1">
+            <a:schemeClr val="accent1"/>
+          </a:lnRef>
+          <a:fillRef idx="3">
+            <a:schemeClr val="accent1"/>
+          </a:fillRef>
+          <a:effectRef idx="2">
+            <a:schemeClr val="accent1"/>
+          </a:effectRef>
+          <a:fontRef idx="minor">
+            <a:schemeClr val="lt1"/>
+          </a:fontRef>
+        </p:style>
+        <p:txBody>
+          <a:bodyPr rtlCol="0" anchor="ctr"/>
+          <a:lstStyle/>
+          <a:p>
+            <a:pPr algn="ctr"/>
+            <a:endParaRPr lang="en-US"/>
+          </a:p>
+        </p:txBody>
+      </p:sp>
+      <p:sp>
+        <p:nvSpPr>
+          <p:cNvPr id="15" name="Up Arrow 14"/>
+          <p:cNvSpPr/>
+          <p:nvPr/>
+        </p:nvSpPr>
+        <p:spPr>
+          <a:xfrm flipV="1">
+            <a:off x="1678819" y="4531360"/>
+            <a:ext cx="5636381" cy="201507"/>
+          </a:xfrm>
+          <a:prstGeom prst="upArrow">
+            <a:avLst>
+              <a:gd name="adj1" fmla="val 50000"/>
+              <a:gd name="adj2" fmla="val 69444"/>
+            </a:avLst>
+          </a:prstGeom>
+        </p:spPr>
+        <p:style>
+          <a:lnRef idx="1">
+            <a:schemeClr val="accent1"/>
+          </a:lnRef>
+          <a:fillRef idx="3">
+            <a:schemeClr val="accent1"/>
+          </a:fillRef>
+          <a:effectRef idx="2">
+            <a:schemeClr val="accent1"/>
+          </a:effectRef>
+          <a:fontRef idx="minor">
+            <a:schemeClr val="lt1"/>
+          </a:fontRef>
+        </p:style>
+        <p:txBody>
+          <a:bodyPr rtlCol="0" anchor="ctr"/>
+          <a:lstStyle/>
+          <a:p>
+            <a:pPr algn="ctr"/>
+            <a:endParaRPr lang="en-US"/>
+          </a:p>
+        </p:txBody>
+      </p:sp>
+      <p:sp>
+        <p:nvSpPr>
+          <p:cNvPr id="16" name="Rounded Rectangle 15"/>
+          <p:cNvSpPr/>
+          <p:nvPr/>
+        </p:nvSpPr>
+        <p:spPr>
+          <a:xfrm>
+            <a:off x="1209525" y="2025348"/>
+            <a:ext cx="1839746" cy="592667"/>
+          </a:xfrm>
+          <a:prstGeom prst="roundRect">
+            <a:avLst/>
+          </a:prstGeom>
+        </p:spPr>
+        <p:style>
+          <a:lnRef idx="1">
+            <a:schemeClr val="accent1"/>
+          </a:lnRef>
+          <a:fillRef idx="3">
+            <a:schemeClr val="accent1"/>
+          </a:fillRef>
+          <a:effectRef idx="2">
+            <a:schemeClr val="accent1"/>
+          </a:effectRef>
+          <a:fontRef idx="minor">
+            <a:schemeClr val="lt1"/>
+          </a:fontRef>
+        </p:style>
+        <p:txBody>
+          <a:bodyPr rtlCol="0" anchor="ctr"/>
+          <a:lstStyle/>
+          <a:p>
+            <a:pPr algn="ctr"/>
+            <a:r>
+              <a:rPr lang="en-US" dirty="0" smtClean="0"/>
+              <a:t>Its Always Sunny</a:t>
+            </a:r>
+            <a:endParaRPr lang="en-US" dirty="0"/>
+          </a:p>
+        </p:txBody>
+      </p:sp>
+      <p:sp>
+        <p:nvSpPr>
+          <p:cNvPr id="17" name="Rounded Rectangle 16"/>
+          <p:cNvSpPr/>
+          <p:nvPr/>
+        </p:nvSpPr>
+        <p:spPr>
+          <a:xfrm>
+            <a:off x="3563257" y="934720"/>
+            <a:ext cx="1839745" cy="497840"/>
+          </a:xfrm>
+          <a:prstGeom prst="roundRect">
+            <a:avLst/>
+          </a:prstGeom>
+        </p:spPr>
+        <p:style>
+          <a:lnRef idx="1">
+            <a:schemeClr val="accent1"/>
+          </a:lnRef>
+          <a:fillRef idx="3">
+            <a:schemeClr val="accent1"/>
+          </a:fillRef>
+          <a:effectRef idx="2">
+            <a:schemeClr val="accent1"/>
+          </a:effectRef>
+          <a:fontRef idx="minor">
+            <a:schemeClr val="lt1"/>
+          </a:fontRef>
+        </p:style>
+        <p:txBody>
+          <a:bodyPr rtlCol="0" anchor="ctr"/>
+          <a:lstStyle/>
+          <a:p>
+            <a:pPr algn="ctr"/>
+            <a:r>
+              <a:rPr lang="en-US" dirty="0" smtClean="0"/>
+              <a:t>Sci-Fi</a:t>
+            </a:r>
+            <a:endParaRPr lang="en-US" dirty="0"/>
+          </a:p>
+        </p:txBody>
+      </p:sp>
+      <p:sp>
+        <p:nvSpPr>
+          <p:cNvPr id="18" name="Rounded Rectangle 17"/>
+          <p:cNvSpPr/>
+          <p:nvPr/>
+        </p:nvSpPr>
+        <p:spPr>
+          <a:xfrm>
+            <a:off x="5849257" y="934720"/>
+            <a:ext cx="1839745" cy="497840"/>
+          </a:xfrm>
+          <a:prstGeom prst="roundRect">
+            <a:avLst/>
+          </a:prstGeom>
+        </p:spPr>
+        <p:style>
+          <a:lnRef idx="1">
+            <a:schemeClr val="accent1"/>
+          </a:lnRef>
+          <a:fillRef idx="3">
+            <a:schemeClr val="accent1"/>
+          </a:fillRef>
+          <a:effectRef idx="2">
+            <a:schemeClr val="accent1"/>
+          </a:effectRef>
+          <a:fontRef idx="minor">
+            <a:schemeClr val="lt1"/>
+          </a:fontRef>
+        </p:style>
+        <p:txBody>
+          <a:bodyPr rtlCol="0" anchor="ctr"/>
+          <a:lstStyle/>
+          <a:p>
+            <a:pPr algn="ctr"/>
+            <a:r>
+              <a:rPr lang="en-US" dirty="0" smtClean="0"/>
+              <a:t>Sports</a:t>
+            </a:r>
+            <a:endParaRPr lang="en-US" dirty="0"/>
+          </a:p>
+        </p:txBody>
+      </p:sp>
+      <p:sp>
+        <p:nvSpPr>
+          <p:cNvPr id="19" name="Rounded Rectangle 18"/>
+          <p:cNvSpPr/>
+          <p:nvPr/>
+        </p:nvSpPr>
+        <p:spPr>
+          <a:xfrm>
+            <a:off x="1209525" y="2879272"/>
+            <a:ext cx="1839746" cy="592667"/>
+          </a:xfrm>
+          <a:prstGeom prst="roundRect">
+            <a:avLst/>
+          </a:prstGeom>
+        </p:spPr>
+        <p:style>
+          <a:lnRef idx="1">
+            <a:schemeClr val="accent1"/>
+          </a:lnRef>
+          <a:fillRef idx="3">
+            <a:schemeClr val="accent1"/>
+          </a:fillRef>
+          <a:effectRef idx="2">
+            <a:schemeClr val="accent1"/>
+          </a:effectRef>
+          <a:fontRef idx="minor">
+            <a:schemeClr val="lt1"/>
+          </a:fontRef>
+        </p:style>
+        <p:txBody>
+          <a:bodyPr rtlCol="0" anchor="ctr"/>
+          <a:lstStyle/>
+          <a:p>
+            <a:pPr algn="ctr"/>
+            <a:r>
+              <a:rPr lang="en-US" dirty="0" err="1" smtClean="0"/>
+              <a:t>Seinfield</a:t>
+            </a:r>
+            <a:endParaRPr lang="en-US" dirty="0"/>
+          </a:p>
+        </p:txBody>
+      </p:sp>
+      <p:sp>
+        <p:nvSpPr>
+          <p:cNvPr id="20" name="Rounded Rectangle 19"/>
+          <p:cNvSpPr/>
+          <p:nvPr/>
+        </p:nvSpPr>
+        <p:spPr>
+          <a:xfrm>
+            <a:off x="1209525" y="3757386"/>
+            <a:ext cx="1839746" cy="592667"/>
+          </a:xfrm>
+          <a:prstGeom prst="roundRect">
+            <a:avLst/>
+          </a:prstGeom>
+        </p:spPr>
+        <p:style>
+          <a:lnRef idx="1">
+            <a:schemeClr val="accent1"/>
+          </a:lnRef>
+          <a:fillRef idx="3">
+            <a:schemeClr val="accent1"/>
+          </a:fillRef>
+          <a:effectRef idx="2">
+            <a:schemeClr val="accent1"/>
+          </a:effectRef>
+          <a:fontRef idx="minor">
+            <a:schemeClr val="lt1"/>
+          </a:fontRef>
+        </p:style>
+        <p:txBody>
+          <a:bodyPr rtlCol="0" anchor="ctr"/>
+          <a:lstStyle/>
+          <a:p>
+            <a:pPr algn="ctr"/>
+            <a:r>
+              <a:rPr lang="en-US" dirty="0" smtClean="0"/>
+              <a:t>Scrubs</a:t>
+            </a:r>
+            <a:endParaRPr lang="en-US" dirty="0"/>
+          </a:p>
+        </p:txBody>
+      </p:sp>
+      <p:sp>
+        <p:nvSpPr>
+          <p:cNvPr id="21" name="Rounded Rectangle 20"/>
+          <p:cNvSpPr/>
+          <p:nvPr/>
+        </p:nvSpPr>
+        <p:spPr>
+          <a:xfrm>
+            <a:off x="3563257" y="2025348"/>
+            <a:ext cx="1839746" cy="592667"/>
+          </a:xfrm>
+          <a:prstGeom prst="roundRect">
+            <a:avLst/>
+          </a:prstGeom>
+        </p:spPr>
+        <p:style>
+          <a:lnRef idx="1">
+            <a:schemeClr val="accent1"/>
+          </a:lnRef>
+          <a:fillRef idx="3">
+            <a:schemeClr val="accent1"/>
+          </a:fillRef>
+          <a:effectRef idx="2">
+            <a:schemeClr val="accent1"/>
+          </a:effectRef>
+          <a:fontRef idx="minor">
+            <a:schemeClr val="lt1"/>
+          </a:fontRef>
+        </p:style>
+        <p:txBody>
+          <a:bodyPr rtlCol="0" anchor="ctr"/>
+          <a:lstStyle/>
+          <a:p>
+            <a:pPr algn="ctr"/>
+            <a:r>
+              <a:rPr lang="en-US" dirty="0" err="1" smtClean="0"/>
+              <a:t>Stargate</a:t>
+            </a:r>
+            <a:r>
+              <a:rPr lang="en-US" dirty="0" smtClean="0"/>
+              <a:t> Atlantis</a:t>
+            </a:r>
+            <a:endParaRPr lang="en-US" dirty="0"/>
+          </a:p>
+        </p:txBody>
+      </p:sp>
+      <p:sp>
+        <p:nvSpPr>
+          <p:cNvPr id="22" name="Rounded Rectangle 21"/>
+          <p:cNvSpPr/>
+          <p:nvPr/>
+        </p:nvSpPr>
+        <p:spPr>
+          <a:xfrm>
+            <a:off x="3563257" y="2879272"/>
+            <a:ext cx="1839746" cy="592667"/>
+          </a:xfrm>
+          <a:prstGeom prst="roundRect">
+            <a:avLst/>
+          </a:prstGeom>
+        </p:spPr>
+        <p:style>
+          <a:lnRef idx="1">
+            <a:schemeClr val="accent1"/>
+          </a:lnRef>
+          <a:fillRef idx="3">
+            <a:schemeClr val="accent1"/>
+          </a:fillRef>
+          <a:effectRef idx="2">
+            <a:schemeClr val="accent1"/>
+          </a:effectRef>
+          <a:fontRef idx="minor">
+            <a:schemeClr val="lt1"/>
+          </a:fontRef>
+        </p:style>
+        <p:txBody>
+          <a:bodyPr rtlCol="0" anchor="ctr"/>
+          <a:lstStyle/>
+          <a:p>
+            <a:pPr algn="ctr"/>
+            <a:r>
+              <a:rPr lang="en-US" dirty="0" smtClean="0"/>
+              <a:t>Hercules</a:t>
+            </a:r>
+            <a:endParaRPr lang="en-US" dirty="0"/>
+          </a:p>
+        </p:txBody>
+      </p:sp>
+      <p:sp>
+        <p:nvSpPr>
+          <p:cNvPr id="23" name="Rounded Rectangle 22"/>
+          <p:cNvSpPr/>
+          <p:nvPr/>
+        </p:nvSpPr>
+        <p:spPr>
+          <a:xfrm>
+            <a:off x="3563257" y="3757386"/>
+            <a:ext cx="1839746" cy="592667"/>
+          </a:xfrm>
+          <a:prstGeom prst="roundRect">
+            <a:avLst/>
+          </a:prstGeom>
+        </p:spPr>
+        <p:style>
+          <a:lnRef idx="1">
+            <a:schemeClr val="accent1"/>
+          </a:lnRef>
+          <a:fillRef idx="3">
+            <a:schemeClr val="accent1"/>
+          </a:fillRef>
+          <a:effectRef idx="2">
+            <a:schemeClr val="accent1"/>
+          </a:effectRef>
+          <a:fontRef idx="minor">
+            <a:schemeClr val="lt1"/>
+          </a:fontRef>
+        </p:style>
+        <p:txBody>
+          <a:bodyPr rtlCol="0" anchor="ctr"/>
+          <a:lstStyle/>
+          <a:p>
+            <a:pPr algn="ctr"/>
+            <a:r>
+              <a:rPr lang="en-US" dirty="0" smtClean="0"/>
+              <a:t>Star Trek</a:t>
+            </a:r>
+            <a:endParaRPr lang="en-US" dirty="0"/>
+          </a:p>
+        </p:txBody>
+      </p:sp>
+      <p:sp>
+        <p:nvSpPr>
+          <p:cNvPr id="24" name="Rounded Rectangle 23"/>
+          <p:cNvSpPr/>
+          <p:nvPr/>
+        </p:nvSpPr>
+        <p:spPr>
+          <a:xfrm>
+            <a:off x="5849257" y="2025348"/>
+            <a:ext cx="1839746" cy="592667"/>
+          </a:xfrm>
+          <a:prstGeom prst="roundRect">
+            <a:avLst/>
+          </a:prstGeom>
+        </p:spPr>
+        <p:style>
+          <a:lnRef idx="1">
+            <a:schemeClr val="accent1"/>
+          </a:lnRef>
+          <a:fillRef idx="3">
+            <a:schemeClr val="accent1"/>
+          </a:fillRef>
+          <a:effectRef idx="2">
+            <a:schemeClr val="accent1"/>
+          </a:effectRef>
+          <a:fontRef idx="minor">
+            <a:schemeClr val="lt1"/>
+          </a:fontRef>
+        </p:style>
+        <p:txBody>
+          <a:bodyPr rtlCol="0" anchor="ctr"/>
+          <a:lstStyle/>
+          <a:p>
+            <a:pPr algn="ctr"/>
+            <a:r>
+              <a:rPr lang="en-US" dirty="0" smtClean="0"/>
+              <a:t>Stanford </a:t>
+            </a:r>
+            <a:r>
+              <a:rPr lang="en-US" dirty="0" err="1" smtClean="0"/>
+              <a:t>vs</a:t>
+            </a:r>
+            <a:r>
+              <a:rPr lang="en-US" dirty="0" smtClean="0"/>
+              <a:t> Cal</a:t>
+            </a:r>
+            <a:endParaRPr lang="en-US" dirty="0"/>
+          </a:p>
+        </p:txBody>
+      </p:sp>
+      <p:sp>
+        <p:nvSpPr>
+          <p:cNvPr id="25" name="Rounded Rectangle 24"/>
+          <p:cNvSpPr/>
+          <p:nvPr/>
+        </p:nvSpPr>
+        <p:spPr>
+          <a:xfrm>
+            <a:off x="5849257" y="2879272"/>
+            <a:ext cx="1839746" cy="592667"/>
+          </a:xfrm>
+          <a:prstGeom prst="roundRect">
+            <a:avLst/>
+          </a:prstGeom>
+        </p:spPr>
+        <p:style>
+          <a:lnRef idx="1">
+            <a:schemeClr val="accent1"/>
+          </a:lnRef>
+          <a:fillRef idx="3">
+            <a:schemeClr val="accent1"/>
+          </a:fillRef>
+          <a:effectRef idx="2">
+            <a:schemeClr val="accent1"/>
+          </a:effectRef>
+          <a:fontRef idx="minor">
+            <a:schemeClr val="lt1"/>
+          </a:fontRef>
+        </p:style>
+        <p:txBody>
+          <a:bodyPr rtlCol="0" anchor="ctr"/>
+          <a:lstStyle/>
+          <a:p>
+            <a:pPr algn="ctr"/>
+            <a:r>
+              <a:rPr lang="en-US" dirty="0" err="1" smtClean="0"/>
+              <a:t>Womens</a:t>
+            </a:r>
+            <a:r>
+              <a:rPr lang="en-US" dirty="0" smtClean="0"/>
+              <a:t> Soccer</a:t>
+            </a:r>
+            <a:endParaRPr lang="en-US" dirty="0"/>
+          </a:p>
+        </p:txBody>
+      </p:sp>
+      <p:sp>
+        <p:nvSpPr>
+          <p:cNvPr id="26" name="Rounded Rectangle 25"/>
+          <p:cNvSpPr/>
+          <p:nvPr/>
+        </p:nvSpPr>
+        <p:spPr>
+          <a:xfrm>
+            <a:off x="5849257" y="3757386"/>
+            <a:ext cx="1839746" cy="592667"/>
+          </a:xfrm>
+          <a:prstGeom prst="roundRect">
+            <a:avLst/>
+          </a:prstGeom>
+        </p:spPr>
+        <p:style>
+          <a:lnRef idx="1">
+            <a:schemeClr val="accent1"/>
+          </a:lnRef>
+          <a:fillRef idx="3">
+            <a:schemeClr val="accent1"/>
+          </a:fillRef>
+          <a:effectRef idx="2">
+            <a:schemeClr val="accent1"/>
+          </a:effectRef>
+          <a:fontRef idx="minor">
+            <a:schemeClr val="lt1"/>
+          </a:fontRef>
+        </p:style>
+        <p:txBody>
+          <a:bodyPr rtlCol="0" anchor="ctr"/>
+          <a:lstStyle/>
+          <a:p>
+            <a:pPr algn="ctr"/>
+            <a:r>
+              <a:rPr lang="en-US" dirty="0" smtClean="0"/>
+              <a:t>NWBA</a:t>
+            </a:r>
+            <a:endParaRPr lang="en-US" dirty="0"/>
+          </a:p>
+        </p:txBody>
+      </p:sp>
+      <p:sp>
+        <p:nvSpPr>
+          <p:cNvPr id="28" name="Up Arrow 27"/>
+          <p:cNvSpPr/>
+          <p:nvPr/>
+        </p:nvSpPr>
+        <p:spPr>
+          <a:xfrm>
+            <a:off x="1678819" y="1574801"/>
+            <a:ext cx="5636381" cy="217714"/>
+          </a:xfrm>
+          <a:prstGeom prst="upArrow">
+            <a:avLst>
+              <a:gd name="adj1" fmla="val 50000"/>
+              <a:gd name="adj2" fmla="val 69444"/>
+            </a:avLst>
+          </a:prstGeom>
+        </p:spPr>
+        <p:style>
+          <a:lnRef idx="1">
+            <a:schemeClr val="accent1"/>
+          </a:lnRef>
+          <a:fillRef idx="3">
+            <a:schemeClr val="accent1"/>
+          </a:fillRef>
+          <a:effectRef idx="2">
+            <a:schemeClr val="accent1"/>
+          </a:effectRef>
+          <a:fontRef idx="minor">
+            <a:schemeClr val="lt1"/>
+          </a:fontRef>
+        </p:style>
+        <p:txBody>
+          <a:bodyPr rtlCol="0" anchor="ctr"/>
+          <a:lstStyle/>
+          <a:p>
+            <a:pPr algn="ctr"/>
+            <a:endParaRPr lang="en-US"/>
+          </a:p>
+        </p:txBody>
+      </p:sp>
+      <p:sp>
+        <p:nvSpPr>
+          <p:cNvPr id="29" name="Rounded Rectangle 28"/>
+          <p:cNvSpPr/>
+          <p:nvPr/>
+        </p:nvSpPr>
+        <p:spPr>
+          <a:xfrm>
+            <a:off x="419916" y="5873638"/>
+            <a:ext cx="8642803" cy="847103"/>
           </a:xfrm>
           <a:prstGeom prst="roundRect">
             <a:avLst/>
@@ -3519,657 +4161,21 @@
           <a:lstStyle/>
           <a:p>
             <a:pPr algn="ctr"/>
-            <a:endParaRPr lang="en-US" sz="1600" dirty="0" smtClean="0"/>
-          </a:p>
-          <a:p>
-            <a:pPr algn="ctr"/>
-            <a:endParaRPr lang="en-US" sz="1600" dirty="0"/>
-          </a:p>
-          <a:p>
-            <a:pPr algn="ctr"/>
-            <a:endParaRPr lang="en-US" sz="1600" dirty="0" smtClean="0"/>
-          </a:p>
-          <a:p>
-            <a:pPr algn="ctr"/>
-            <a:r>
-              <a:rPr lang="en-US" sz="1600" dirty="0" err="1" smtClean="0"/>
-              <a:t>Futurama</a:t>
-            </a:r>
-            <a:endParaRPr lang="en-US" sz="1600" dirty="0"/>
-          </a:p>
-        </p:txBody>
-      </p:sp>
-      <p:sp>
-        <p:nvSpPr>
-          <p:cNvPr id="107" name="Rounded Rectangle 106"/>
-          <p:cNvSpPr/>
-          <p:nvPr/>
-        </p:nvSpPr>
-        <p:spPr>
-          <a:xfrm>
-            <a:off x="3657758" y="1755753"/>
-            <a:ext cx="1778000" cy="1009812"/>
-          </a:xfrm>
-          <a:prstGeom prst="roundRect">
-            <a:avLst/>
-          </a:prstGeom>
-        </p:spPr>
-        <p:style>
-          <a:lnRef idx="2">
-            <a:schemeClr val="accent5"/>
-          </a:lnRef>
-          <a:fillRef idx="1">
-            <a:schemeClr val="lt1"/>
-          </a:fillRef>
-          <a:effectRef idx="0">
-            <a:schemeClr val="accent5"/>
-          </a:effectRef>
-          <a:fontRef idx="minor">
-            <a:schemeClr val="dk1"/>
-          </a:fontRef>
-        </p:style>
-        <p:txBody>
-          <a:bodyPr rtlCol="0" anchor="ctr"/>
-          <a:lstStyle/>
-          <a:p>
-            <a:pPr algn="ctr"/>
-            <a:endParaRPr lang="en-US" sz="1600" dirty="0" smtClean="0"/>
-          </a:p>
-          <a:p>
-            <a:pPr algn="ctr"/>
-            <a:endParaRPr lang="en-US" sz="1600" dirty="0"/>
-          </a:p>
-          <a:p>
-            <a:pPr algn="ctr"/>
-            <a:endParaRPr lang="en-US" sz="1600" dirty="0" smtClean="0"/>
-          </a:p>
-          <a:p>
-            <a:pPr algn="ctr"/>
-            <a:r>
-              <a:rPr lang="en-US" sz="1600" dirty="0" smtClean="0"/>
-              <a:t>30 Rock</a:t>
-            </a:r>
-            <a:endParaRPr lang="en-US" sz="1600" dirty="0"/>
-          </a:p>
-        </p:txBody>
-      </p:sp>
-      <p:sp>
-        <p:nvSpPr>
-          <p:cNvPr id="108" name="Rounded Rectangle 107"/>
-          <p:cNvSpPr/>
-          <p:nvPr/>
-        </p:nvSpPr>
-        <p:spPr>
-          <a:xfrm>
-            <a:off x="1085986" y="3236753"/>
-            <a:ext cx="1778000" cy="1009812"/>
-          </a:xfrm>
-          <a:prstGeom prst="roundRect">
-            <a:avLst/>
-          </a:prstGeom>
-        </p:spPr>
-        <p:style>
-          <a:lnRef idx="2">
-            <a:schemeClr val="accent5"/>
-          </a:lnRef>
-          <a:fillRef idx="1">
-            <a:schemeClr val="lt1"/>
-          </a:fillRef>
-          <a:effectRef idx="0">
-            <a:schemeClr val="accent5"/>
-          </a:effectRef>
-          <a:fontRef idx="minor">
-            <a:schemeClr val="dk1"/>
-          </a:fontRef>
-        </p:style>
-        <p:txBody>
-          <a:bodyPr rtlCol="0" anchor="ctr"/>
-          <a:lstStyle/>
-          <a:p>
-            <a:pPr algn="ctr"/>
-            <a:endParaRPr lang="en-US" sz="1600" dirty="0"/>
-          </a:p>
-          <a:p>
-            <a:pPr algn="ctr"/>
-            <a:endParaRPr lang="en-US" sz="1600" dirty="0" smtClean="0"/>
-          </a:p>
-          <a:p>
-            <a:pPr algn="ctr"/>
-            <a:endParaRPr lang="en-US" sz="1600" dirty="0"/>
-          </a:p>
-          <a:p>
-            <a:pPr algn="ctr"/>
-            <a:r>
-              <a:rPr lang="en-US" sz="1600" dirty="0" smtClean="0"/>
-              <a:t>Glee</a:t>
-            </a:r>
-          </a:p>
-        </p:txBody>
-      </p:sp>
-      <p:sp>
-        <p:nvSpPr>
-          <p:cNvPr id="109" name="Rounded Rectangle 108"/>
-          <p:cNvSpPr/>
-          <p:nvPr/>
-        </p:nvSpPr>
-        <p:spPr>
-          <a:xfrm>
-            <a:off x="6211035" y="1751490"/>
-            <a:ext cx="1778000" cy="1009812"/>
-          </a:xfrm>
-          <a:prstGeom prst="roundRect">
-            <a:avLst/>
-          </a:prstGeom>
-        </p:spPr>
-        <p:style>
-          <a:lnRef idx="2">
-            <a:schemeClr val="accent5"/>
-          </a:lnRef>
-          <a:fillRef idx="1">
-            <a:schemeClr val="lt1"/>
-          </a:fillRef>
-          <a:effectRef idx="0">
-            <a:schemeClr val="accent5"/>
-          </a:effectRef>
-          <a:fontRef idx="minor">
-            <a:schemeClr val="dk1"/>
-          </a:fontRef>
-        </p:style>
-        <p:txBody>
-          <a:bodyPr rtlCol="0" anchor="ctr"/>
-          <a:lstStyle/>
-          <a:p>
-            <a:pPr algn="ctr"/>
-            <a:endParaRPr lang="en-US" dirty="0" smtClean="0"/>
-          </a:p>
-          <a:p>
-            <a:pPr algn="ctr"/>
-            <a:endParaRPr lang="en-US" dirty="0"/>
-          </a:p>
-          <a:p>
-            <a:pPr algn="ctr"/>
-            <a:endParaRPr lang="en-US" dirty="0"/>
-          </a:p>
-          <a:p>
-            <a:pPr algn="ctr"/>
-            <a:r>
-              <a:rPr lang="en-US" sz="1400" dirty="0" err="1" smtClean="0"/>
-              <a:t>Kindergarden</a:t>
-            </a:r>
-            <a:r>
-              <a:rPr lang="en-US" sz="1400" dirty="0" smtClean="0"/>
-              <a:t> Cop</a:t>
-            </a:r>
-            <a:endParaRPr lang="en-US" sz="1400" dirty="0"/>
-          </a:p>
-        </p:txBody>
-      </p:sp>
-      <p:sp>
-        <p:nvSpPr>
-          <p:cNvPr id="110" name="Rounded Rectangle 109"/>
-          <p:cNvSpPr/>
-          <p:nvPr/>
-        </p:nvSpPr>
-        <p:spPr>
-          <a:xfrm>
-            <a:off x="6224939" y="3191975"/>
-            <a:ext cx="1778000" cy="1009812"/>
-          </a:xfrm>
-          <a:prstGeom prst="roundRect">
-            <a:avLst/>
-          </a:prstGeom>
-        </p:spPr>
-        <p:style>
-          <a:lnRef idx="2">
-            <a:schemeClr val="accent5"/>
-          </a:lnRef>
-          <a:fillRef idx="1">
-            <a:schemeClr val="lt1"/>
-          </a:fillRef>
-          <a:effectRef idx="0">
-            <a:schemeClr val="accent5"/>
-          </a:effectRef>
-          <a:fontRef idx="minor">
-            <a:schemeClr val="dk1"/>
-          </a:fontRef>
-        </p:style>
-        <p:txBody>
-          <a:bodyPr rtlCol="0" anchor="ctr"/>
-          <a:lstStyle/>
-          <a:p>
-            <a:pPr algn="ctr"/>
-            <a:endParaRPr lang="en-US" dirty="0" smtClean="0"/>
-          </a:p>
-          <a:p>
-            <a:pPr algn="ctr"/>
-            <a:endParaRPr lang="en-US" dirty="0"/>
-          </a:p>
-          <a:p>
-            <a:pPr algn="ctr"/>
-            <a:endParaRPr lang="en-US" dirty="0" smtClean="0"/>
-          </a:p>
-          <a:p>
-            <a:pPr algn="ctr"/>
-            <a:r>
-              <a:rPr lang="en-US" sz="1600" dirty="0" smtClean="0"/>
-              <a:t>Scrubs</a:t>
-            </a:r>
-            <a:endParaRPr lang="en-US" sz="1600" dirty="0"/>
-          </a:p>
-        </p:txBody>
-      </p:sp>
-      <p:sp>
-        <p:nvSpPr>
-          <p:cNvPr id="111" name="Rounded Rectangle 110"/>
-          <p:cNvSpPr/>
-          <p:nvPr/>
-        </p:nvSpPr>
-        <p:spPr>
-          <a:xfrm>
-            <a:off x="3657758" y="3226593"/>
-            <a:ext cx="1778000" cy="1009812"/>
-          </a:xfrm>
-          <a:prstGeom prst="roundRect">
-            <a:avLst/>
-          </a:prstGeom>
-        </p:spPr>
-        <p:style>
-          <a:lnRef idx="2">
-            <a:schemeClr val="accent5"/>
-          </a:lnRef>
-          <a:fillRef idx="1">
-            <a:schemeClr val="lt1"/>
-          </a:fillRef>
-          <a:effectRef idx="0">
-            <a:schemeClr val="accent5"/>
-          </a:effectRef>
-          <a:fontRef idx="minor">
-            <a:schemeClr val="dk1"/>
-          </a:fontRef>
-        </p:style>
-        <p:txBody>
-          <a:bodyPr rtlCol="0" anchor="ctr"/>
-          <a:lstStyle/>
-          <a:p>
-            <a:pPr algn="ctr"/>
-            <a:endParaRPr lang="en-US" sz="1600" dirty="0" smtClean="0"/>
-          </a:p>
-          <a:p>
-            <a:pPr algn="ctr"/>
-            <a:endParaRPr lang="en-US" sz="1600" dirty="0"/>
-          </a:p>
-          <a:p>
-            <a:pPr algn="ctr"/>
-            <a:endParaRPr lang="en-US" sz="1600" dirty="0" smtClean="0"/>
-          </a:p>
-          <a:p>
-            <a:pPr algn="ctr"/>
-            <a:r>
-              <a:rPr lang="en-US" sz="1600" dirty="0" smtClean="0"/>
-              <a:t>The Ring</a:t>
-            </a:r>
-            <a:endParaRPr lang="en-US" sz="1600" dirty="0"/>
-          </a:p>
-        </p:txBody>
-      </p:sp>
-      <p:pic>
-        <p:nvPicPr>
-          <p:cNvPr id="112" name="Picture 111" descr="futurama_510.jpg"/>
-          <p:cNvPicPr>
-            <a:picLocks noChangeAspect="1"/>
-          </p:cNvPicPr>
-          <p:nvPr/>
-        </p:nvPicPr>
-        <p:blipFill>
-          <a:blip r:embed="rId3">
-            <a:extLst>
-              <a:ext uri="{28A0092B-C50C-407E-A947-70E740481C1C}">
-                <a14:useLocalDpi xmlns:a14="http://schemas.microsoft.com/office/drawing/2010/main" val="0"/>
-              </a:ext>
-            </a:extLst>
-          </a:blip>
-          <a:stretch>
-            <a:fillRect/>
-          </a:stretch>
-        </p:blipFill>
-        <p:spPr>
-          <a:xfrm>
-            <a:off x="1218712" y="1808012"/>
-            <a:ext cx="1503032" cy="747870"/>
-          </a:xfrm>
-          <a:prstGeom prst="rect">
-            <a:avLst/>
-          </a:prstGeom>
-        </p:spPr>
-      </p:pic>
-      <p:pic>
-        <p:nvPicPr>
-          <p:cNvPr id="113" name="Picture 112" descr="30-rock-alec-baldwin-suicide.jpeg"/>
-          <p:cNvPicPr>
-            <a:picLocks noChangeAspect="1"/>
-          </p:cNvPicPr>
-          <p:nvPr/>
-        </p:nvPicPr>
-        <p:blipFill>
-          <a:blip r:embed="rId4">
-            <a:extLst>
-              <a:ext uri="{28A0092B-C50C-407E-A947-70E740481C1C}">
-                <a14:useLocalDpi xmlns:a14="http://schemas.microsoft.com/office/drawing/2010/main" val="0"/>
-              </a:ext>
-            </a:extLst>
-          </a:blip>
-          <a:stretch>
-            <a:fillRect/>
-          </a:stretch>
-        </p:blipFill>
-        <p:spPr>
-          <a:xfrm>
-            <a:off x="3799999" y="1769591"/>
-            <a:ext cx="1503032" cy="777461"/>
-          </a:xfrm>
-          <a:prstGeom prst="rect">
-            <a:avLst/>
-          </a:prstGeom>
-        </p:spPr>
-      </p:pic>
-      <p:pic>
-        <p:nvPicPr>
-          <p:cNvPr id="114" name="Picture 113" descr="1-arnold-schwarzenegger-kindergarten-cop.jpg"/>
-          <p:cNvPicPr>
-            <a:picLocks noChangeAspect="1"/>
-          </p:cNvPicPr>
-          <p:nvPr/>
-        </p:nvPicPr>
-        <p:blipFill>
-          <a:blip r:embed="rId5">
-            <a:extLst>
-              <a:ext uri="{28A0092B-C50C-407E-A947-70E740481C1C}">
-                <a14:useLocalDpi xmlns:a14="http://schemas.microsoft.com/office/drawing/2010/main" val="0"/>
-              </a:ext>
-            </a:extLst>
-          </a:blip>
-          <a:stretch>
-            <a:fillRect/>
-          </a:stretch>
-        </p:blipFill>
-        <p:spPr>
-          <a:xfrm>
-            <a:off x="6375346" y="1769591"/>
-            <a:ext cx="1456612" cy="798670"/>
-          </a:xfrm>
-          <a:prstGeom prst="rect">
-            <a:avLst/>
-          </a:prstGeom>
-        </p:spPr>
-      </p:pic>
-      <p:pic>
-        <p:nvPicPr>
-          <p:cNvPr id="115" name="Picture 114" descr="scrubsbromance.jpg"/>
-          <p:cNvPicPr>
-            <a:picLocks noChangeAspect="1"/>
-          </p:cNvPicPr>
-          <p:nvPr/>
-        </p:nvPicPr>
-        <p:blipFill>
-          <a:blip r:embed="rId6">
-            <a:extLst>
-              <a:ext uri="{28A0092B-C50C-407E-A947-70E740481C1C}">
-                <a14:useLocalDpi xmlns:a14="http://schemas.microsoft.com/office/drawing/2010/main" val="0"/>
-              </a:ext>
-            </a:extLst>
-          </a:blip>
-          <a:stretch>
-            <a:fillRect/>
-          </a:stretch>
-        </p:blipFill>
-        <p:spPr>
-          <a:xfrm>
-            <a:off x="6310452" y="3197221"/>
-            <a:ext cx="1581977" cy="817879"/>
-          </a:xfrm>
-          <a:prstGeom prst="rect">
-            <a:avLst/>
-          </a:prstGeom>
-        </p:spPr>
-      </p:pic>
-      <p:pic>
-        <p:nvPicPr>
-          <p:cNvPr id="116" name="Picture 115" descr="i_like_pancakes.jpg"/>
-          <p:cNvPicPr>
-            <a:picLocks noChangeAspect="1"/>
-          </p:cNvPicPr>
-          <p:nvPr/>
-        </p:nvPicPr>
-        <p:blipFill>
-          <a:blip r:embed="rId7">
-            <a:extLst>
-              <a:ext uri="{28A0092B-C50C-407E-A947-70E740481C1C}">
-                <a14:useLocalDpi xmlns:a14="http://schemas.microsoft.com/office/drawing/2010/main" val="0"/>
-              </a:ext>
-            </a:extLst>
-          </a:blip>
-          <a:stretch>
-            <a:fillRect/>
-          </a:stretch>
-        </p:blipFill>
-        <p:spPr>
-          <a:xfrm>
-            <a:off x="3687146" y="3257073"/>
-            <a:ext cx="1638103" cy="758027"/>
-          </a:xfrm>
-          <a:prstGeom prst="rect">
-            <a:avLst/>
-          </a:prstGeom>
-        </p:spPr>
-      </p:pic>
-      <p:pic>
-        <p:nvPicPr>
-          <p:cNvPr id="117" name="Picture 116" descr="Glee-Misfits.jpg"/>
-          <p:cNvPicPr>
-            <a:picLocks noChangeAspect="1"/>
-          </p:cNvPicPr>
-          <p:nvPr/>
-        </p:nvPicPr>
-        <p:blipFill>
-          <a:blip r:embed="rId8">
-            <a:extLst>
-              <a:ext uri="{28A0092B-C50C-407E-A947-70E740481C1C}">
-                <a14:useLocalDpi xmlns:a14="http://schemas.microsoft.com/office/drawing/2010/main" val="0"/>
-              </a:ext>
-            </a:extLst>
-          </a:blip>
-          <a:stretch>
-            <a:fillRect/>
-          </a:stretch>
-        </p:blipFill>
-        <p:spPr>
-          <a:xfrm>
-            <a:off x="1218712" y="3257073"/>
-            <a:ext cx="1524489" cy="759088"/>
-          </a:xfrm>
-          <a:prstGeom prst="rect">
-            <a:avLst/>
-          </a:prstGeom>
-        </p:spPr>
-      </p:pic>
-      <p:sp>
-        <p:nvSpPr>
-          <p:cNvPr id="118" name="Rounded Rectangle 117"/>
-          <p:cNvSpPr/>
-          <p:nvPr/>
-        </p:nvSpPr>
-        <p:spPr>
-          <a:xfrm>
-            <a:off x="1076470" y="4643121"/>
-            <a:ext cx="6912565" cy="538480"/>
-          </a:xfrm>
-          <a:prstGeom prst="roundRect">
-            <a:avLst/>
-          </a:prstGeom>
-        </p:spPr>
-        <p:style>
-          <a:lnRef idx="1">
-            <a:schemeClr val="accent5"/>
-          </a:lnRef>
-          <a:fillRef idx="2">
-            <a:schemeClr val="accent5"/>
-          </a:fillRef>
-          <a:effectRef idx="1">
-            <a:schemeClr val="accent5"/>
-          </a:effectRef>
-          <a:fontRef idx="minor">
-            <a:schemeClr val="dk1"/>
-          </a:fontRef>
-        </p:style>
-        <p:txBody>
-          <a:bodyPr rtlCol="0" anchor="ctr"/>
-          <a:lstStyle/>
-          <a:p>
-            <a:pPr algn="ctr"/>
-            <a:r>
-              <a:rPr lang="en-US" dirty="0" smtClean="0">
+            <a:r>
+              <a:rPr lang="en-US" b="1" dirty="0">
                 <a:solidFill>
                   <a:schemeClr val="tx1"/>
                 </a:solidFill>
               </a:rPr>
-              <a:t>Browse All Shows</a:t>
-            </a:r>
-          </a:p>
-        </p:txBody>
-      </p:sp>
-      <p:sp>
-        <p:nvSpPr>
-          <p:cNvPr id="119" name="Rounded Rectangle 118"/>
-          <p:cNvSpPr/>
-          <p:nvPr/>
-        </p:nvSpPr>
-        <p:spPr>
-          <a:xfrm>
-            <a:off x="680720" y="528320"/>
-            <a:ext cx="1168400" cy="416560"/>
-          </a:xfrm>
-          <a:prstGeom prst="roundRect">
-            <a:avLst/>
-          </a:prstGeom>
-        </p:spPr>
-        <p:style>
-          <a:lnRef idx="2">
-            <a:schemeClr val="dk1"/>
-          </a:lnRef>
-          <a:fillRef idx="1">
-            <a:schemeClr val="lt1"/>
-          </a:fillRef>
-          <a:effectRef idx="0">
-            <a:schemeClr val="dk1"/>
-          </a:effectRef>
-          <a:fontRef idx="minor">
-            <a:schemeClr val="dk1"/>
-          </a:fontRef>
-        </p:style>
-        <p:txBody>
-          <a:bodyPr rtlCol="0" anchor="ctr"/>
-          <a:lstStyle/>
-          <a:p>
-            <a:pPr algn="ctr"/>
-            <a:r>
-              <a:rPr lang="en-US" dirty="0" smtClean="0"/>
-              <a:t>HOME</a:t>
-            </a:r>
-            <a:endParaRPr lang="en-US" dirty="0"/>
-          </a:p>
-        </p:txBody>
-      </p:sp>
-      <p:sp>
-        <p:nvSpPr>
-          <p:cNvPr id="120" name="Rounded Rectangle 119"/>
-          <p:cNvSpPr/>
-          <p:nvPr/>
-        </p:nvSpPr>
-        <p:spPr>
-          <a:xfrm>
-            <a:off x="2225040" y="802640"/>
-            <a:ext cx="4582160" cy="609600"/>
-          </a:xfrm>
-          <a:prstGeom prst="roundRect">
-            <a:avLst/>
-          </a:prstGeom>
-        </p:spPr>
-        <p:style>
-          <a:lnRef idx="1">
-            <a:schemeClr val="accent1"/>
-          </a:lnRef>
-          <a:fillRef idx="3">
-            <a:schemeClr val="accent1"/>
-          </a:fillRef>
-          <a:effectRef idx="2">
-            <a:schemeClr val="accent1"/>
-          </a:effectRef>
-          <a:fontRef idx="minor">
-            <a:schemeClr val="lt1"/>
-          </a:fontRef>
-        </p:style>
-        <p:txBody>
-          <a:bodyPr rtlCol="0" anchor="ctr"/>
-          <a:lstStyle/>
-          <a:p>
-            <a:pPr algn="ctr"/>
-            <a:r>
-              <a:rPr lang="en-US" dirty="0" smtClean="0"/>
-              <a:t>Recommendations</a:t>
-            </a:r>
-            <a:endParaRPr lang="en-US" dirty="0"/>
-          </a:p>
-        </p:txBody>
-      </p:sp>
-      <p:sp>
-        <p:nvSpPr>
-          <p:cNvPr id="19" name="Rounded Rectangle 18"/>
-          <p:cNvSpPr/>
-          <p:nvPr/>
-        </p:nvSpPr>
-        <p:spPr>
-          <a:xfrm>
-            <a:off x="267517" y="5721239"/>
-            <a:ext cx="8642803" cy="847103"/>
-          </a:xfrm>
-          <a:prstGeom prst="roundRect">
-            <a:avLst/>
-          </a:prstGeom>
-        </p:spPr>
-        <p:style>
-          <a:lnRef idx="2">
-            <a:schemeClr val="accent5"/>
-          </a:lnRef>
-          <a:fillRef idx="1">
-            <a:schemeClr val="lt1"/>
-          </a:fillRef>
-          <a:effectRef idx="0">
-            <a:schemeClr val="accent5"/>
-          </a:effectRef>
-          <a:fontRef idx="minor">
-            <a:schemeClr val="dk1"/>
-          </a:fontRef>
-        </p:style>
-        <p:txBody>
-          <a:bodyPr rtlCol="0" anchor="ctr"/>
-          <a:lstStyle/>
-          <a:p>
-            <a:pPr algn="ctr"/>
-            <a:r>
-              <a:rPr lang="en-US" b="1" dirty="0" smtClean="0">
+              <a:t>Test 6</a:t>
+            </a:r>
+            <a:r>
+              <a:rPr lang="en-US" dirty="0">
                 <a:solidFill>
                   <a:schemeClr val="tx1"/>
                 </a:solidFill>
               </a:rPr>
-              <a:t>Test 5</a:t>
-            </a:r>
-            <a:r>
-              <a:rPr lang="en-US" dirty="0" smtClean="0">
-                <a:solidFill>
-                  <a:schemeClr val="tx1"/>
-                </a:solidFill>
-              </a:rPr>
-              <a:t>: Go to the Browse All area</a:t>
+              <a:t>: Find and watch the movie The Ring</a:t>
             </a:r>
           </a:p>
         </p:txBody>
@@ -4177,7 +4183,7 @@
     </p:spTree>
     <p:extLst>
       <p:ext uri="{BB962C8B-B14F-4D97-AF65-F5344CB8AC3E}">
-        <p14:creationId xmlns:p14="http://schemas.microsoft.com/office/powerpoint/2010/main" val="2405954791"/>
+        <p14:creationId xmlns:p14="http://schemas.microsoft.com/office/powerpoint/2010/main" val="833046039"/>
       </p:ext>
     </p:extLst>
   </p:cSld>
@@ -4187,7 +4193,7 @@
   <p:timing>
     <p:tnLst>
       <p:par>
-        <p:cTn xmlns:p14="http://schemas.microsoft.com/office/powerpoint/2010/main" id="1" dur="indefinite" restart="never" nodeType="tmRoot"/>
+        <p:cTn id="1" dur="indefinite" restart="never" nodeType="tmRoot"/>
       </p:par>
     </p:tnLst>
   </p:timing>
@@ -4277,7 +4283,7 @@
             <a:pPr algn="ctr"/>
             <a:r>
               <a:rPr lang="en-US" dirty="0" smtClean="0"/>
-              <a:t>Comedy</a:t>
+              <a:t>Horror</a:t>
             </a:r>
             <a:endParaRPr lang="en-US" dirty="0"/>
           </a:p>
@@ -4285,14 +4291,14 @@
       </p:sp>
       <p:sp>
         <p:nvSpPr>
-          <p:cNvPr id="13" name="Left Arrow 12"/>
-          <p:cNvSpPr/>
-          <p:nvPr/>
-        </p:nvSpPr>
-        <p:spPr>
-          <a:xfrm flipH="1">
-            <a:off x="8129270" y="1910080"/>
-            <a:ext cx="274017" cy="2621280"/>
+          <p:cNvPr id="12" name="Left Arrow 11"/>
+          <p:cNvSpPr/>
+          <p:nvPr/>
+        </p:nvSpPr>
+        <p:spPr>
+          <a:xfrm>
+            <a:off x="701040" y="1910080"/>
+            <a:ext cx="275590" cy="2621280"/>
           </a:xfrm>
           <a:prstGeom prst="leftArrow">
             <a:avLst>
@@ -4326,14 +4332,55 @@
       </p:sp>
       <p:sp>
         <p:nvSpPr>
-          <p:cNvPr id="15" name="Up Arrow 14"/>
-          <p:cNvSpPr/>
-          <p:nvPr/>
-        </p:nvSpPr>
-        <p:spPr>
-          <a:xfrm flipV="1">
-            <a:off x="1678819" y="4531360"/>
-            <a:ext cx="5636381" cy="201507"/>
+          <p:cNvPr id="13" name="Left Arrow 12"/>
+          <p:cNvSpPr/>
+          <p:nvPr/>
+        </p:nvSpPr>
+        <p:spPr>
+          <a:xfrm flipH="1">
+            <a:off x="8129270" y="1910080"/>
+            <a:ext cx="274017" cy="2621280"/>
+          </a:xfrm>
+          <a:prstGeom prst="leftArrow">
+            <a:avLst>
+              <a:gd name="adj1" fmla="val 49758"/>
+              <a:gd name="adj2" fmla="val 75000"/>
+            </a:avLst>
+          </a:prstGeom>
+        </p:spPr>
+        <p:style>
+          <a:lnRef idx="1">
+            <a:schemeClr val="accent1"/>
+          </a:lnRef>
+          <a:fillRef idx="3">
+            <a:schemeClr val="accent1"/>
+          </a:fillRef>
+          <a:effectRef idx="2">
+            <a:schemeClr val="accent1"/>
+          </a:effectRef>
+          <a:fontRef idx="minor">
+            <a:schemeClr val="lt1"/>
+          </a:fontRef>
+        </p:style>
+        <p:txBody>
+          <a:bodyPr rtlCol="0" anchor="ctr"/>
+          <a:lstStyle/>
+          <a:p>
+            <a:pPr algn="ctr"/>
+            <a:endParaRPr lang="en-US"/>
+          </a:p>
+        </p:txBody>
+      </p:sp>
+      <p:sp>
+        <p:nvSpPr>
+          <p:cNvPr id="14" name="Up Arrow 13"/>
+          <p:cNvSpPr/>
+          <p:nvPr/>
+        </p:nvSpPr>
+        <p:spPr>
+          <a:xfrm>
+            <a:off x="1678819" y="1574801"/>
+            <a:ext cx="5636381" cy="217714"/>
           </a:xfrm>
           <a:prstGeom prst="upArrow">
             <a:avLst>
@@ -4367,6 +4414,47 @@
       </p:sp>
       <p:sp>
         <p:nvSpPr>
+          <p:cNvPr id="15" name="Up Arrow 14"/>
+          <p:cNvSpPr/>
+          <p:nvPr/>
+        </p:nvSpPr>
+        <p:spPr>
+          <a:xfrm flipV="1">
+            <a:off x="1678819" y="4531360"/>
+            <a:ext cx="5636381" cy="201507"/>
+          </a:xfrm>
+          <a:prstGeom prst="upArrow">
+            <a:avLst>
+              <a:gd name="adj1" fmla="val 50000"/>
+              <a:gd name="adj2" fmla="val 69444"/>
+            </a:avLst>
+          </a:prstGeom>
+        </p:spPr>
+        <p:style>
+          <a:lnRef idx="1">
+            <a:schemeClr val="accent1"/>
+          </a:lnRef>
+          <a:fillRef idx="3">
+            <a:schemeClr val="accent1"/>
+          </a:fillRef>
+          <a:effectRef idx="2">
+            <a:schemeClr val="accent1"/>
+          </a:effectRef>
+          <a:fontRef idx="minor">
+            <a:schemeClr val="lt1"/>
+          </a:fontRef>
+        </p:style>
+        <p:txBody>
+          <a:bodyPr rtlCol="0" anchor="ctr"/>
+          <a:lstStyle/>
+          <a:p>
+            <a:pPr algn="ctr"/>
+            <a:endParaRPr lang="en-US"/>
+          </a:p>
+        </p:txBody>
+      </p:sp>
+      <p:sp>
+        <p:nvSpPr>
           <p:cNvPr id="16" name="Rounded Rectangle 15"/>
           <p:cNvSpPr/>
           <p:nvPr/>
@@ -4401,7 +4489,7 @@
             <a:pPr algn="ctr"/>
             <a:r>
               <a:rPr lang="en-US" dirty="0" smtClean="0"/>
-              <a:t>How I Met Your Mother</a:t>
+              <a:t>Ester</a:t>
             </a:r>
             <a:endParaRPr lang="en-US" dirty="0"/>
           </a:p>
@@ -4443,7 +4531,7 @@
             <a:pPr algn="ctr"/>
             <a:r>
               <a:rPr lang="en-US" dirty="0" smtClean="0"/>
-              <a:t>Sci-Fi</a:t>
+              <a:t>Reality</a:t>
             </a:r>
             <a:endParaRPr lang="en-US" dirty="0"/>
           </a:p>
@@ -4485,7 +4573,7 @@
             <a:pPr algn="ctr"/>
             <a:r>
               <a:rPr lang="en-US" dirty="0" smtClean="0"/>
-              <a:t>Sports</a:t>
+              <a:t>Action</a:t>
             </a:r>
             <a:endParaRPr lang="en-US" dirty="0"/>
           </a:p>
@@ -4527,7 +4615,7 @@
             <a:pPr algn="ctr"/>
             <a:r>
               <a:rPr lang="en-US" dirty="0" smtClean="0"/>
-              <a:t>30 Rock</a:t>
+              <a:t>The Ring</a:t>
             </a:r>
             <a:endParaRPr lang="en-US" dirty="0"/>
           </a:p>
@@ -4568,8 +4656,8 @@
           <a:p>
             <a:pPr algn="ctr"/>
             <a:r>
-              <a:rPr lang="en-US" dirty="0" err="1" smtClean="0"/>
-              <a:t>Futurama</a:t>
+              <a:rPr lang="en-US" dirty="0" smtClean="0"/>
+              <a:t>Drag Me to Hell</a:t>
             </a:r>
             <a:endParaRPr lang="en-US" dirty="0"/>
           </a:p>
@@ -4611,7 +4699,7 @@
             <a:pPr algn="ctr"/>
             <a:r>
               <a:rPr lang="en-US" dirty="0" smtClean="0"/>
-              <a:t>Firefly</a:t>
+              <a:t>Survivor</a:t>
             </a:r>
             <a:endParaRPr lang="en-US" dirty="0"/>
           </a:p>
@@ -4653,15 +4741,7 @@
             <a:pPr algn="ctr"/>
             <a:r>
               <a:rPr lang="en-US" dirty="0" smtClean="0"/>
-              <a:t>Mega Shark </a:t>
-            </a:r>
-            <a:r>
-              <a:rPr lang="en-US" dirty="0" err="1" smtClean="0"/>
-              <a:t>vs</a:t>
-            </a:r>
-            <a:r>
-              <a:rPr lang="en-US" dirty="0" smtClean="0"/>
-              <a:t> Giant Octopus</a:t>
+              <a:t>The Real World</a:t>
             </a:r>
             <a:endParaRPr lang="en-US" dirty="0"/>
           </a:p>
@@ -4702,12 +4782,8 @@
           <a:p>
             <a:pPr algn="ctr"/>
             <a:r>
-              <a:rPr lang="en-US" dirty="0" err="1" smtClean="0"/>
-              <a:t>Stargate</a:t>
-            </a:r>
-            <a:r>
               <a:rPr lang="en-US" dirty="0" smtClean="0"/>
-              <a:t> SG-1</a:t>
+              <a:t>Jersey Shore</a:t>
             </a:r>
             <a:endParaRPr lang="en-US" dirty="0"/>
           </a:p>
@@ -4748,16 +4824,12 @@
           <a:p>
             <a:pPr algn="ctr"/>
             <a:r>
+              <a:rPr lang="en-US" dirty="0" err="1" smtClean="0"/>
+              <a:t>Kindergarden</a:t>
+            </a:r>
+            <a:r>
               <a:rPr lang="en-US" dirty="0" smtClean="0"/>
-              <a:t>49ers </a:t>
-            </a:r>
-            <a:r>
-              <a:rPr lang="en-US" dirty="0" err="1" smtClean="0"/>
-              <a:t>vs</a:t>
-            </a:r>
-            <a:r>
-              <a:rPr lang="en-US" dirty="0" smtClean="0"/>
-              <a:t> Buccaneers</a:t>
+              <a:t> Cop</a:t>
             </a:r>
             <a:endParaRPr lang="en-US" dirty="0"/>
           </a:p>
@@ -4799,7 +4871,7 @@
             <a:pPr algn="ctr"/>
             <a:r>
               <a:rPr lang="en-US" dirty="0" smtClean="0"/>
-              <a:t>NHL Hockey</a:t>
+              <a:t>Die Hard</a:t>
             </a:r>
             <a:endParaRPr lang="en-US" dirty="0"/>
           </a:p>
@@ -4841,15 +4913,7 @@
             <a:pPr algn="ctr"/>
             <a:r>
               <a:rPr lang="en-US" dirty="0" smtClean="0"/>
-              <a:t>Bulls </a:t>
-            </a:r>
-            <a:r>
-              <a:rPr lang="en-US" dirty="0" err="1" smtClean="0"/>
-              <a:t>vs</a:t>
-            </a:r>
-            <a:r>
-              <a:rPr lang="en-US" dirty="0" smtClean="0"/>
-              <a:t> Celtics</a:t>
+              <a:t>Lethal Weapon</a:t>
             </a:r>
             <a:endParaRPr lang="en-US" dirty="0"/>
           </a:p>
@@ -4857,7 +4921,7 @@
       </p:sp>
       <p:sp>
         <p:nvSpPr>
-          <p:cNvPr id="27" name="Rounded Rectangle 26"/>
+          <p:cNvPr id="28" name="Rounded Rectangle 27"/>
           <p:cNvSpPr/>
           <p:nvPr/>
         </p:nvSpPr>
@@ -4921,7 +4985,7 @@
   <p:timing>
     <p:tnLst>
       <p:par>
-        <p:cTn xmlns:p14="http://schemas.microsoft.com/office/powerpoint/2010/main" id="1" dur="indefinite" restart="never" nodeType="tmRoot"/>
+        <p:cTn id="1" dur="indefinite" restart="never" nodeType="tmRoot"/>
       </p:par>
     </p:tnLst>
   </p:timing>
@@ -4975,735 +5039,40 @@
           </a:prstGeom>
         </p:spPr>
       </p:pic>
-      <p:sp>
-        <p:nvSpPr>
-          <p:cNvPr id="2" name="Rounded Rectangle 1"/>
-          <p:cNvSpPr/>
-          <p:nvPr/>
-        </p:nvSpPr>
-        <p:spPr>
-          <a:xfrm>
-            <a:off x="1209524" y="934720"/>
-            <a:ext cx="1839745" cy="497840"/>
-          </a:xfrm>
-          <a:prstGeom prst="roundRect">
-            <a:avLst/>
-          </a:prstGeom>
-        </p:spPr>
-        <p:style>
-          <a:lnRef idx="1">
-            <a:schemeClr val="accent1"/>
-          </a:lnRef>
-          <a:fillRef idx="3">
-            <a:schemeClr val="accent1"/>
-          </a:fillRef>
-          <a:effectRef idx="2">
-            <a:schemeClr val="accent1"/>
-          </a:effectRef>
-          <a:fontRef idx="minor">
-            <a:schemeClr val="lt1"/>
-          </a:fontRef>
-        </p:style>
-        <p:txBody>
-          <a:bodyPr rtlCol="0" anchor="ctr"/>
-          <a:lstStyle/>
-          <a:p>
-            <a:pPr algn="ctr"/>
-            <a:r>
-              <a:rPr lang="en-US" dirty="0" smtClean="0"/>
-              <a:t>Horror</a:t>
-            </a:r>
-            <a:endParaRPr lang="en-US" dirty="0"/>
-          </a:p>
-        </p:txBody>
-      </p:sp>
-      <p:sp>
-        <p:nvSpPr>
-          <p:cNvPr id="12" name="Left Arrow 11"/>
-          <p:cNvSpPr/>
-          <p:nvPr/>
-        </p:nvSpPr>
-        <p:spPr>
-          <a:xfrm>
-            <a:off x="701040" y="1910080"/>
-            <a:ext cx="275590" cy="2621280"/>
-          </a:xfrm>
-          <a:prstGeom prst="leftArrow">
-            <a:avLst>
-              <a:gd name="adj1" fmla="val 49758"/>
-              <a:gd name="adj2" fmla="val 75000"/>
-            </a:avLst>
-          </a:prstGeom>
-        </p:spPr>
-        <p:style>
-          <a:lnRef idx="1">
-            <a:schemeClr val="accent1"/>
-          </a:lnRef>
-          <a:fillRef idx="3">
-            <a:schemeClr val="accent1"/>
-          </a:fillRef>
-          <a:effectRef idx="2">
-            <a:schemeClr val="accent1"/>
-          </a:effectRef>
-          <a:fontRef idx="minor">
-            <a:schemeClr val="lt1"/>
-          </a:fontRef>
-        </p:style>
-        <p:txBody>
-          <a:bodyPr rtlCol="0" anchor="ctr"/>
-          <a:lstStyle/>
-          <a:p>
-            <a:pPr algn="ctr"/>
-            <a:endParaRPr lang="en-US"/>
-          </a:p>
-        </p:txBody>
-      </p:sp>
-      <p:sp>
-        <p:nvSpPr>
-          <p:cNvPr id="13" name="Left Arrow 12"/>
-          <p:cNvSpPr/>
-          <p:nvPr/>
-        </p:nvSpPr>
-        <p:spPr>
-          <a:xfrm flipH="1">
-            <a:off x="8129270" y="1910080"/>
-            <a:ext cx="274017" cy="2621280"/>
-          </a:xfrm>
-          <a:prstGeom prst="leftArrow">
-            <a:avLst>
-              <a:gd name="adj1" fmla="val 49758"/>
-              <a:gd name="adj2" fmla="val 75000"/>
-            </a:avLst>
-          </a:prstGeom>
-        </p:spPr>
-        <p:style>
-          <a:lnRef idx="1">
-            <a:schemeClr val="accent1"/>
-          </a:lnRef>
-          <a:fillRef idx="3">
-            <a:schemeClr val="accent1"/>
-          </a:fillRef>
-          <a:effectRef idx="2">
-            <a:schemeClr val="accent1"/>
-          </a:effectRef>
-          <a:fontRef idx="minor">
-            <a:schemeClr val="lt1"/>
-          </a:fontRef>
-        </p:style>
-        <p:txBody>
-          <a:bodyPr rtlCol="0" anchor="ctr"/>
-          <a:lstStyle/>
-          <a:p>
-            <a:pPr algn="ctr"/>
-            <a:endParaRPr lang="en-US"/>
-          </a:p>
-        </p:txBody>
-      </p:sp>
-      <p:sp>
-        <p:nvSpPr>
-          <p:cNvPr id="14" name="Up Arrow 13"/>
-          <p:cNvSpPr/>
-          <p:nvPr/>
-        </p:nvSpPr>
-        <p:spPr>
-          <a:xfrm>
-            <a:off x="1678819" y="1574801"/>
-            <a:ext cx="5636381" cy="217714"/>
-          </a:xfrm>
-          <a:prstGeom prst="upArrow">
-            <a:avLst>
-              <a:gd name="adj1" fmla="val 50000"/>
-              <a:gd name="adj2" fmla="val 69444"/>
-            </a:avLst>
-          </a:prstGeom>
-        </p:spPr>
-        <p:style>
-          <a:lnRef idx="1">
-            <a:schemeClr val="accent1"/>
-          </a:lnRef>
-          <a:fillRef idx="3">
-            <a:schemeClr val="accent1"/>
-          </a:fillRef>
-          <a:effectRef idx="2">
-            <a:schemeClr val="accent1"/>
-          </a:effectRef>
-          <a:fontRef idx="minor">
-            <a:schemeClr val="lt1"/>
-          </a:fontRef>
-        </p:style>
-        <p:txBody>
-          <a:bodyPr rtlCol="0" anchor="ctr"/>
-          <a:lstStyle/>
-          <a:p>
-            <a:pPr algn="ctr"/>
-            <a:endParaRPr lang="en-US"/>
-          </a:p>
-        </p:txBody>
-      </p:sp>
-      <p:sp>
-        <p:nvSpPr>
-          <p:cNvPr id="15" name="Up Arrow 14"/>
-          <p:cNvSpPr/>
-          <p:nvPr/>
-        </p:nvSpPr>
-        <p:spPr>
-          <a:xfrm flipV="1">
-            <a:off x="1678819" y="4531360"/>
-            <a:ext cx="5636381" cy="201507"/>
-          </a:xfrm>
-          <a:prstGeom prst="upArrow">
-            <a:avLst>
-              <a:gd name="adj1" fmla="val 50000"/>
-              <a:gd name="adj2" fmla="val 69444"/>
-            </a:avLst>
-          </a:prstGeom>
-        </p:spPr>
-        <p:style>
-          <a:lnRef idx="1">
-            <a:schemeClr val="accent1"/>
-          </a:lnRef>
-          <a:fillRef idx="3">
-            <a:schemeClr val="accent1"/>
-          </a:fillRef>
-          <a:effectRef idx="2">
-            <a:schemeClr val="accent1"/>
-          </a:effectRef>
-          <a:fontRef idx="minor">
-            <a:schemeClr val="lt1"/>
-          </a:fontRef>
-        </p:style>
-        <p:txBody>
-          <a:bodyPr rtlCol="0" anchor="ctr"/>
-          <a:lstStyle/>
-          <a:p>
-            <a:pPr algn="ctr"/>
-            <a:endParaRPr lang="en-US"/>
-          </a:p>
-        </p:txBody>
-      </p:sp>
-      <p:sp>
-        <p:nvSpPr>
-          <p:cNvPr id="16" name="Rounded Rectangle 15"/>
-          <p:cNvSpPr/>
-          <p:nvPr/>
-        </p:nvSpPr>
-        <p:spPr>
-          <a:xfrm>
-            <a:off x="1209525" y="2025348"/>
-            <a:ext cx="1839746" cy="592667"/>
-          </a:xfrm>
-          <a:prstGeom prst="roundRect">
-            <a:avLst/>
-          </a:prstGeom>
-        </p:spPr>
-        <p:style>
-          <a:lnRef idx="1">
-            <a:schemeClr val="accent1"/>
-          </a:lnRef>
-          <a:fillRef idx="3">
-            <a:schemeClr val="accent1"/>
-          </a:fillRef>
-          <a:effectRef idx="2">
-            <a:schemeClr val="accent1"/>
-          </a:effectRef>
-          <a:fontRef idx="minor">
-            <a:schemeClr val="lt1"/>
-          </a:fontRef>
-        </p:style>
-        <p:txBody>
-          <a:bodyPr rtlCol="0" anchor="ctr"/>
-          <a:lstStyle/>
-          <a:p>
-            <a:pPr algn="ctr"/>
-            <a:r>
-              <a:rPr lang="en-US" dirty="0" smtClean="0"/>
-              <a:t>Ester</a:t>
-            </a:r>
-            <a:endParaRPr lang="en-US" dirty="0"/>
-          </a:p>
-        </p:txBody>
-      </p:sp>
-      <p:sp>
-        <p:nvSpPr>
-          <p:cNvPr id="17" name="Rounded Rectangle 16"/>
-          <p:cNvSpPr/>
-          <p:nvPr/>
-        </p:nvSpPr>
-        <p:spPr>
-          <a:xfrm>
-            <a:off x="3563257" y="934720"/>
-            <a:ext cx="1839745" cy="497840"/>
-          </a:xfrm>
-          <a:prstGeom prst="roundRect">
-            <a:avLst/>
-          </a:prstGeom>
-        </p:spPr>
-        <p:style>
-          <a:lnRef idx="1">
-            <a:schemeClr val="accent1"/>
-          </a:lnRef>
-          <a:fillRef idx="3">
-            <a:schemeClr val="accent1"/>
-          </a:fillRef>
-          <a:effectRef idx="2">
-            <a:schemeClr val="accent1"/>
-          </a:effectRef>
-          <a:fontRef idx="minor">
-            <a:schemeClr val="lt1"/>
-          </a:fontRef>
-        </p:style>
-        <p:txBody>
-          <a:bodyPr rtlCol="0" anchor="ctr"/>
-          <a:lstStyle/>
-          <a:p>
-            <a:pPr algn="ctr"/>
-            <a:r>
-              <a:rPr lang="en-US" dirty="0" smtClean="0"/>
-              <a:t>Reality</a:t>
-            </a:r>
-            <a:endParaRPr lang="en-US" dirty="0"/>
-          </a:p>
-        </p:txBody>
-      </p:sp>
-      <p:sp>
-        <p:nvSpPr>
-          <p:cNvPr id="18" name="Rounded Rectangle 17"/>
-          <p:cNvSpPr/>
-          <p:nvPr/>
-        </p:nvSpPr>
-        <p:spPr>
-          <a:xfrm>
-            <a:off x="5849257" y="934720"/>
-            <a:ext cx="1839745" cy="497840"/>
-          </a:xfrm>
-          <a:prstGeom prst="roundRect">
-            <a:avLst/>
-          </a:prstGeom>
-        </p:spPr>
-        <p:style>
-          <a:lnRef idx="1">
-            <a:schemeClr val="accent1"/>
-          </a:lnRef>
-          <a:fillRef idx="3">
-            <a:schemeClr val="accent1"/>
-          </a:fillRef>
-          <a:effectRef idx="2">
-            <a:schemeClr val="accent1"/>
-          </a:effectRef>
-          <a:fontRef idx="minor">
-            <a:schemeClr val="lt1"/>
-          </a:fontRef>
-        </p:style>
-        <p:txBody>
-          <a:bodyPr rtlCol="0" anchor="ctr"/>
-          <a:lstStyle/>
-          <a:p>
-            <a:pPr algn="ctr"/>
-            <a:r>
-              <a:rPr lang="en-US" dirty="0" smtClean="0"/>
-              <a:t>Action</a:t>
-            </a:r>
-            <a:endParaRPr lang="en-US" dirty="0"/>
-          </a:p>
-        </p:txBody>
-      </p:sp>
-      <p:sp>
-        <p:nvSpPr>
-          <p:cNvPr id="19" name="Rounded Rectangle 18"/>
-          <p:cNvSpPr/>
-          <p:nvPr/>
-        </p:nvSpPr>
-        <p:spPr>
-          <a:xfrm>
-            <a:off x="1209525" y="2879272"/>
-            <a:ext cx="1839746" cy="592667"/>
-          </a:xfrm>
-          <a:prstGeom prst="roundRect">
-            <a:avLst/>
-          </a:prstGeom>
-        </p:spPr>
-        <p:style>
-          <a:lnRef idx="1">
-            <a:schemeClr val="accent1"/>
-          </a:lnRef>
-          <a:fillRef idx="3">
-            <a:schemeClr val="accent1"/>
-          </a:fillRef>
-          <a:effectRef idx="2">
-            <a:schemeClr val="accent1"/>
-          </a:effectRef>
-          <a:fontRef idx="minor">
-            <a:schemeClr val="lt1"/>
-          </a:fontRef>
-        </p:style>
-        <p:txBody>
-          <a:bodyPr rtlCol="0" anchor="ctr"/>
-          <a:lstStyle/>
-          <a:p>
-            <a:pPr algn="ctr"/>
-            <a:r>
-              <a:rPr lang="en-US" dirty="0" smtClean="0"/>
-              <a:t>The Ring</a:t>
-            </a:r>
-            <a:endParaRPr lang="en-US" dirty="0"/>
-          </a:p>
-        </p:txBody>
-      </p:sp>
-      <p:sp>
-        <p:nvSpPr>
-          <p:cNvPr id="20" name="Rounded Rectangle 19"/>
-          <p:cNvSpPr/>
-          <p:nvPr/>
-        </p:nvSpPr>
-        <p:spPr>
-          <a:xfrm>
-            <a:off x="1209525" y="3757386"/>
-            <a:ext cx="1839746" cy="592667"/>
-          </a:xfrm>
-          <a:prstGeom prst="roundRect">
-            <a:avLst/>
-          </a:prstGeom>
-        </p:spPr>
-        <p:style>
-          <a:lnRef idx="1">
-            <a:schemeClr val="accent1"/>
-          </a:lnRef>
-          <a:fillRef idx="3">
-            <a:schemeClr val="accent1"/>
-          </a:fillRef>
-          <a:effectRef idx="2">
-            <a:schemeClr val="accent1"/>
-          </a:effectRef>
-          <a:fontRef idx="minor">
-            <a:schemeClr val="lt1"/>
-          </a:fontRef>
-        </p:style>
-        <p:txBody>
-          <a:bodyPr rtlCol="0" anchor="ctr"/>
-          <a:lstStyle/>
-          <a:p>
-            <a:pPr algn="ctr"/>
-            <a:r>
-              <a:rPr lang="en-US" dirty="0" smtClean="0"/>
-              <a:t>Drag Me to Hell</a:t>
-            </a:r>
-            <a:endParaRPr lang="en-US" dirty="0"/>
-          </a:p>
-        </p:txBody>
-      </p:sp>
-      <p:sp>
-        <p:nvSpPr>
-          <p:cNvPr id="21" name="Rounded Rectangle 20"/>
-          <p:cNvSpPr/>
-          <p:nvPr/>
-        </p:nvSpPr>
-        <p:spPr>
-          <a:xfrm>
-            <a:off x="3563257" y="2025348"/>
-            <a:ext cx="1839746" cy="592667"/>
-          </a:xfrm>
-          <a:prstGeom prst="roundRect">
-            <a:avLst/>
-          </a:prstGeom>
-        </p:spPr>
-        <p:style>
-          <a:lnRef idx="1">
-            <a:schemeClr val="accent1"/>
-          </a:lnRef>
-          <a:fillRef idx="3">
-            <a:schemeClr val="accent1"/>
-          </a:fillRef>
-          <a:effectRef idx="2">
-            <a:schemeClr val="accent1"/>
-          </a:effectRef>
-          <a:fontRef idx="minor">
-            <a:schemeClr val="lt1"/>
-          </a:fontRef>
-        </p:style>
-        <p:txBody>
-          <a:bodyPr rtlCol="0" anchor="ctr"/>
-          <a:lstStyle/>
-          <a:p>
-            <a:pPr algn="ctr"/>
-            <a:r>
-              <a:rPr lang="en-US" dirty="0" smtClean="0"/>
-              <a:t>Survivor</a:t>
-            </a:r>
-            <a:endParaRPr lang="en-US" dirty="0"/>
-          </a:p>
-        </p:txBody>
-      </p:sp>
-      <p:sp>
-        <p:nvSpPr>
-          <p:cNvPr id="22" name="Rounded Rectangle 21"/>
-          <p:cNvSpPr/>
-          <p:nvPr/>
-        </p:nvSpPr>
-        <p:spPr>
-          <a:xfrm>
-            <a:off x="3563257" y="2879272"/>
-            <a:ext cx="1839746" cy="592667"/>
-          </a:xfrm>
-          <a:prstGeom prst="roundRect">
-            <a:avLst/>
-          </a:prstGeom>
-        </p:spPr>
-        <p:style>
-          <a:lnRef idx="1">
-            <a:schemeClr val="accent1"/>
-          </a:lnRef>
-          <a:fillRef idx="3">
-            <a:schemeClr val="accent1"/>
-          </a:fillRef>
-          <a:effectRef idx="2">
-            <a:schemeClr val="accent1"/>
-          </a:effectRef>
-          <a:fontRef idx="minor">
-            <a:schemeClr val="lt1"/>
-          </a:fontRef>
-        </p:style>
-        <p:txBody>
-          <a:bodyPr rtlCol="0" anchor="ctr"/>
-          <a:lstStyle/>
-          <a:p>
-            <a:pPr algn="ctr"/>
-            <a:r>
-              <a:rPr lang="en-US" dirty="0" smtClean="0"/>
-              <a:t>The Real World</a:t>
-            </a:r>
-            <a:endParaRPr lang="en-US" dirty="0"/>
-          </a:p>
-        </p:txBody>
-      </p:sp>
-      <p:sp>
-        <p:nvSpPr>
-          <p:cNvPr id="23" name="Rounded Rectangle 22"/>
-          <p:cNvSpPr/>
-          <p:nvPr/>
-        </p:nvSpPr>
-        <p:spPr>
-          <a:xfrm>
-            <a:off x="3563257" y="3757386"/>
-            <a:ext cx="1839746" cy="592667"/>
-          </a:xfrm>
-          <a:prstGeom prst="roundRect">
-            <a:avLst/>
-          </a:prstGeom>
-        </p:spPr>
-        <p:style>
-          <a:lnRef idx="1">
-            <a:schemeClr val="accent1"/>
-          </a:lnRef>
-          <a:fillRef idx="3">
-            <a:schemeClr val="accent1"/>
-          </a:fillRef>
-          <a:effectRef idx="2">
-            <a:schemeClr val="accent1"/>
-          </a:effectRef>
-          <a:fontRef idx="minor">
-            <a:schemeClr val="lt1"/>
-          </a:fontRef>
-        </p:style>
-        <p:txBody>
-          <a:bodyPr rtlCol="0" anchor="ctr"/>
-          <a:lstStyle/>
-          <a:p>
-            <a:pPr algn="ctr"/>
-            <a:r>
-              <a:rPr lang="en-US" dirty="0" smtClean="0"/>
-              <a:t>Jersey Shore</a:t>
-            </a:r>
-            <a:endParaRPr lang="en-US" dirty="0"/>
-          </a:p>
-        </p:txBody>
-      </p:sp>
-      <p:sp>
-        <p:nvSpPr>
-          <p:cNvPr id="24" name="Rounded Rectangle 23"/>
-          <p:cNvSpPr/>
-          <p:nvPr/>
-        </p:nvSpPr>
-        <p:spPr>
-          <a:xfrm>
-            <a:off x="5849257" y="2025348"/>
-            <a:ext cx="1839746" cy="592667"/>
-          </a:xfrm>
-          <a:prstGeom prst="roundRect">
-            <a:avLst/>
-          </a:prstGeom>
-        </p:spPr>
-        <p:style>
-          <a:lnRef idx="1">
-            <a:schemeClr val="accent1"/>
-          </a:lnRef>
-          <a:fillRef idx="3">
-            <a:schemeClr val="accent1"/>
-          </a:fillRef>
-          <a:effectRef idx="2">
-            <a:schemeClr val="accent1"/>
-          </a:effectRef>
-          <a:fontRef idx="minor">
-            <a:schemeClr val="lt1"/>
-          </a:fontRef>
-        </p:style>
-        <p:txBody>
-          <a:bodyPr rtlCol="0" anchor="ctr"/>
-          <a:lstStyle/>
-          <a:p>
-            <a:pPr algn="ctr"/>
-            <a:r>
-              <a:rPr lang="en-US" dirty="0" err="1" smtClean="0"/>
-              <a:t>Kindergarden</a:t>
-            </a:r>
-            <a:r>
-              <a:rPr lang="en-US" dirty="0" smtClean="0"/>
-              <a:t> Cop</a:t>
-            </a:r>
-            <a:endParaRPr lang="en-US" dirty="0"/>
-          </a:p>
-        </p:txBody>
-      </p:sp>
-      <p:sp>
-        <p:nvSpPr>
-          <p:cNvPr id="25" name="Rounded Rectangle 24"/>
-          <p:cNvSpPr/>
-          <p:nvPr/>
-        </p:nvSpPr>
-        <p:spPr>
-          <a:xfrm>
-            <a:off x="5849257" y="2879272"/>
-            <a:ext cx="1839746" cy="592667"/>
-          </a:xfrm>
-          <a:prstGeom prst="roundRect">
-            <a:avLst/>
-          </a:prstGeom>
-        </p:spPr>
-        <p:style>
-          <a:lnRef idx="1">
-            <a:schemeClr val="accent1"/>
-          </a:lnRef>
-          <a:fillRef idx="3">
-            <a:schemeClr val="accent1"/>
-          </a:fillRef>
-          <a:effectRef idx="2">
-            <a:schemeClr val="accent1"/>
-          </a:effectRef>
-          <a:fontRef idx="minor">
-            <a:schemeClr val="lt1"/>
-          </a:fontRef>
-        </p:style>
-        <p:txBody>
-          <a:bodyPr rtlCol="0" anchor="ctr"/>
-          <a:lstStyle/>
-          <a:p>
-            <a:pPr algn="ctr"/>
-            <a:r>
-              <a:rPr lang="en-US" dirty="0" smtClean="0"/>
-              <a:t>Die Hard</a:t>
-            </a:r>
-            <a:endParaRPr lang="en-US" dirty="0"/>
-          </a:p>
-        </p:txBody>
-      </p:sp>
-      <p:sp>
-        <p:nvSpPr>
-          <p:cNvPr id="26" name="Rounded Rectangle 25"/>
-          <p:cNvSpPr/>
-          <p:nvPr/>
-        </p:nvSpPr>
-        <p:spPr>
-          <a:xfrm>
-            <a:off x="5849257" y="3757386"/>
-            <a:ext cx="1839746" cy="592667"/>
-          </a:xfrm>
-          <a:prstGeom prst="roundRect">
-            <a:avLst/>
-          </a:prstGeom>
-        </p:spPr>
-        <p:style>
-          <a:lnRef idx="1">
-            <a:schemeClr val="accent1"/>
-          </a:lnRef>
-          <a:fillRef idx="3">
-            <a:schemeClr val="accent1"/>
-          </a:fillRef>
-          <a:effectRef idx="2">
-            <a:schemeClr val="accent1"/>
-          </a:effectRef>
-          <a:fontRef idx="minor">
-            <a:schemeClr val="lt1"/>
-          </a:fontRef>
-        </p:style>
-        <p:txBody>
-          <a:bodyPr rtlCol="0" anchor="ctr"/>
-          <a:lstStyle/>
-          <a:p>
-            <a:pPr algn="ctr"/>
-            <a:r>
-              <a:rPr lang="en-US" dirty="0" smtClean="0"/>
-              <a:t>Lethal Weapon</a:t>
-            </a:r>
-            <a:endParaRPr lang="en-US" dirty="0"/>
-          </a:p>
-        </p:txBody>
-      </p:sp>
-      <p:sp>
-        <p:nvSpPr>
-          <p:cNvPr id="28" name="Rounded Rectangle 27"/>
-          <p:cNvSpPr/>
-          <p:nvPr/>
-        </p:nvSpPr>
-        <p:spPr>
-          <a:xfrm>
-            <a:off x="267517" y="5721239"/>
-            <a:ext cx="8642803" cy="847103"/>
-          </a:xfrm>
-          <a:prstGeom prst="roundRect">
-            <a:avLst/>
-          </a:prstGeom>
-        </p:spPr>
-        <p:style>
-          <a:lnRef idx="2">
-            <a:schemeClr val="accent5"/>
-          </a:lnRef>
-          <a:fillRef idx="1">
-            <a:schemeClr val="lt1"/>
-          </a:fillRef>
-          <a:effectRef idx="0">
-            <a:schemeClr val="accent5"/>
-          </a:effectRef>
-          <a:fontRef idx="minor">
-            <a:schemeClr val="dk1"/>
-          </a:fontRef>
-        </p:style>
-        <p:txBody>
-          <a:bodyPr rtlCol="0" anchor="ctr"/>
-          <a:lstStyle/>
-          <a:p>
-            <a:pPr algn="ctr"/>
-            <a:r>
-              <a:rPr lang="en-US" b="1" dirty="0" smtClean="0">
-                <a:solidFill>
-                  <a:schemeClr val="tx1"/>
-                </a:solidFill>
-              </a:rPr>
-              <a:t>Test 6</a:t>
-            </a:r>
-            <a:r>
-              <a:rPr lang="en-US" dirty="0" smtClean="0">
-                <a:solidFill>
-                  <a:schemeClr val="tx1"/>
-                </a:solidFill>
-              </a:rPr>
-              <a:t>: Find and watch the movie The Ring</a:t>
-            </a:r>
-          </a:p>
-        </p:txBody>
-      </p:sp>
+      <p:pic>
+        <p:nvPicPr>
+          <p:cNvPr id="2" name="Picture 1" descr="i_like_pancakes.jpg"/>
+          <p:cNvPicPr>
+            <a:picLocks noChangeAspect="1"/>
+          </p:cNvPicPr>
+          <p:nvPr/>
+        </p:nvPicPr>
+        <p:blipFill>
+          <a:blip r:embed="rId3">
+            <a:extLst>
+              <a:ext uri="{28A0092B-C50C-407E-A947-70E740481C1C}">
+                <a14:useLocalDpi xmlns:a14="http://schemas.microsoft.com/office/drawing/2010/main" val="0"/>
+              </a:ext>
+            </a:extLst>
+          </a:blip>
+          <a:stretch>
+            <a:fillRect/>
+          </a:stretch>
+        </p:blipFill>
+        <p:spPr>
+          <a:xfrm>
+            <a:off x="632815" y="542151"/>
+            <a:ext cx="7849234" cy="4504247"/>
+          </a:xfrm>
+          <a:prstGeom prst="rect">
+            <a:avLst/>
+          </a:prstGeom>
+        </p:spPr>
+      </p:pic>
     </p:spTree>
     <p:extLst>
       <p:ext uri="{BB962C8B-B14F-4D97-AF65-F5344CB8AC3E}">
-        <p14:creationId xmlns:p14="http://schemas.microsoft.com/office/powerpoint/2010/main" val="939524691"/>
+        <p14:creationId xmlns:p14="http://schemas.microsoft.com/office/powerpoint/2010/main" val="1603241096"/>
       </p:ext>
     </p:extLst>
   </p:cSld>
@@ -5713,7 +5082,7 @@
   <p:timing>
     <p:tnLst>
       <p:par>
-        <p:cTn xmlns:p14="http://schemas.microsoft.com/office/powerpoint/2010/main" id="1" dur="indefinite" restart="never" nodeType="tmRoot"/>
+        <p:cTn id="1" dur="indefinite" restart="never" nodeType="tmRoot"/>
       </p:par>
     </p:tnLst>
   </p:timing>
@@ -5797,10 +5166,63 @@
           </a:prstGeom>
         </p:spPr>
       </p:pic>
+      <p:sp>
+        <p:nvSpPr>
+          <p:cNvPr id="5" name="Rounded Rectangle 4"/>
+          <p:cNvSpPr/>
+          <p:nvPr/>
+        </p:nvSpPr>
+        <p:spPr>
+          <a:xfrm>
+            <a:off x="267517" y="5721239"/>
+            <a:ext cx="8642803" cy="847103"/>
+          </a:xfrm>
+          <a:prstGeom prst="roundRect">
+            <a:avLst/>
+          </a:prstGeom>
+        </p:spPr>
+        <p:style>
+          <a:lnRef idx="2">
+            <a:schemeClr val="accent5"/>
+          </a:lnRef>
+          <a:fillRef idx="1">
+            <a:schemeClr val="lt1"/>
+          </a:fillRef>
+          <a:effectRef idx="0">
+            <a:schemeClr val="accent5"/>
+          </a:effectRef>
+          <a:fontRef idx="minor">
+            <a:schemeClr val="dk1"/>
+          </a:fontRef>
+        </p:style>
+        <p:txBody>
+          <a:bodyPr rtlCol="0" anchor="ctr"/>
+          <a:lstStyle/>
+          <a:p>
+            <a:pPr algn="ctr"/>
+            <a:r>
+              <a:rPr lang="en-US" b="1" dirty="0" smtClean="0">
+                <a:solidFill>
+                  <a:schemeClr val="tx1"/>
+                </a:solidFill>
+              </a:rPr>
+              <a:t>Test 7</a:t>
+            </a:r>
+            <a:r>
+              <a:rPr lang="en-US" dirty="0" smtClean="0">
+                <a:solidFill>
+                  <a:schemeClr val="tx1"/>
+                </a:solidFill>
+              </a:rPr>
+              <a:t>: Go To Home</a:t>
+            </a:r>
+          </a:p>
+        </p:txBody>
+      </p:sp>
     </p:spTree>
     <p:extLst>
       <p:ext uri="{BB962C8B-B14F-4D97-AF65-F5344CB8AC3E}">
-        <p14:creationId xmlns:p14="http://schemas.microsoft.com/office/powerpoint/2010/main" val="1603241096"/>
+        <p14:creationId xmlns:p14="http://schemas.microsoft.com/office/powerpoint/2010/main" val="3414738069"/>
       </p:ext>
     </p:extLst>
   </p:cSld>
@@ -5810,7 +5232,7 @@
   <p:timing>
     <p:tnLst>
       <p:par>
-        <p:cTn xmlns:p14="http://schemas.microsoft.com/office/powerpoint/2010/main" id="1" dur="indefinite" restart="never" nodeType="tmRoot"/>
+        <p:cTn id="1" dur="indefinite" restart="never" nodeType="tmRoot"/>
       </p:par>
     </p:tnLst>
   </p:timing>
@@ -5864,9 +5286,389 @@
           </a:prstGeom>
         </p:spPr>
       </p:pic>
+      <p:sp>
+        <p:nvSpPr>
+          <p:cNvPr id="2" name="Rounded Rectangle 1"/>
+          <p:cNvSpPr/>
+          <p:nvPr/>
+        </p:nvSpPr>
+        <p:spPr>
+          <a:xfrm>
+            <a:off x="267517" y="5721239"/>
+            <a:ext cx="8642803" cy="847103"/>
+          </a:xfrm>
+          <a:prstGeom prst="roundRect">
+            <a:avLst/>
+          </a:prstGeom>
+        </p:spPr>
+        <p:style>
+          <a:lnRef idx="2">
+            <a:schemeClr val="accent5"/>
+          </a:lnRef>
+          <a:fillRef idx="1">
+            <a:schemeClr val="lt1"/>
+          </a:fillRef>
+          <a:effectRef idx="0">
+            <a:schemeClr val="accent5"/>
+          </a:effectRef>
+          <a:fontRef idx="minor">
+            <a:schemeClr val="dk1"/>
+          </a:fontRef>
+        </p:style>
+        <p:txBody>
+          <a:bodyPr rtlCol="0" anchor="ctr"/>
+          <a:lstStyle/>
+          <a:p>
+            <a:pPr algn="ctr"/>
+            <a:r>
+              <a:rPr lang="en-US" b="1" dirty="0" smtClean="0">
+                <a:solidFill>
+                  <a:schemeClr val="tx1"/>
+                </a:solidFill>
+              </a:rPr>
+              <a:t>Highlight</a:t>
+            </a:r>
+            <a:r>
+              <a:rPr lang="en-US" dirty="0" smtClean="0">
+                <a:solidFill>
+                  <a:schemeClr val="tx1"/>
+                </a:solidFill>
+              </a:rPr>
+              <a:t>: Move your arm and the highlighted show/movie will change</a:t>
+            </a:r>
+          </a:p>
+        </p:txBody>
+      </p:sp>
+      <p:sp>
+        <p:nvSpPr>
+          <p:cNvPr id="106" name="Rounded Rectangle 105"/>
+          <p:cNvSpPr/>
+          <p:nvPr/>
+        </p:nvSpPr>
+        <p:spPr>
+          <a:xfrm>
+            <a:off x="1076471" y="1769591"/>
+            <a:ext cx="1778000" cy="1009812"/>
+          </a:xfrm>
+          <a:prstGeom prst="roundRect">
+            <a:avLst/>
+          </a:prstGeom>
+        </p:spPr>
+        <p:style>
+          <a:lnRef idx="2">
+            <a:schemeClr val="accent5"/>
+          </a:lnRef>
+          <a:fillRef idx="1">
+            <a:schemeClr val="lt1"/>
+          </a:fillRef>
+          <a:effectRef idx="0">
+            <a:schemeClr val="accent5"/>
+          </a:effectRef>
+          <a:fontRef idx="minor">
+            <a:schemeClr val="dk1"/>
+          </a:fontRef>
+        </p:style>
+        <p:txBody>
+          <a:bodyPr rtlCol="0" anchor="ctr"/>
+          <a:lstStyle/>
+          <a:p>
+            <a:pPr algn="ctr"/>
+            <a:endParaRPr lang="en-US" sz="1600" dirty="0" smtClean="0"/>
+          </a:p>
+          <a:p>
+            <a:pPr algn="ctr"/>
+            <a:endParaRPr lang="en-US" sz="1600" dirty="0"/>
+          </a:p>
+          <a:p>
+            <a:pPr algn="ctr"/>
+            <a:endParaRPr lang="en-US" sz="1600" dirty="0" smtClean="0"/>
+          </a:p>
+          <a:p>
+            <a:pPr algn="ctr"/>
+            <a:r>
+              <a:rPr lang="en-US" sz="1600" dirty="0" err="1" smtClean="0"/>
+              <a:t>Futurama</a:t>
+            </a:r>
+            <a:endParaRPr lang="en-US" sz="1600" dirty="0"/>
+          </a:p>
+        </p:txBody>
+      </p:sp>
+      <p:sp>
+        <p:nvSpPr>
+          <p:cNvPr id="107" name="Rounded Rectangle 106"/>
+          <p:cNvSpPr/>
+          <p:nvPr/>
+        </p:nvSpPr>
+        <p:spPr>
+          <a:xfrm>
+            <a:off x="3657758" y="1755753"/>
+            <a:ext cx="1778000" cy="1009812"/>
+          </a:xfrm>
+          <a:prstGeom prst="roundRect">
+            <a:avLst/>
+          </a:prstGeom>
+        </p:spPr>
+        <p:style>
+          <a:lnRef idx="2">
+            <a:schemeClr val="accent5"/>
+          </a:lnRef>
+          <a:fillRef idx="1">
+            <a:schemeClr val="lt1"/>
+          </a:fillRef>
+          <a:effectRef idx="0">
+            <a:schemeClr val="accent5"/>
+          </a:effectRef>
+          <a:fontRef idx="minor">
+            <a:schemeClr val="dk1"/>
+          </a:fontRef>
+        </p:style>
+        <p:txBody>
+          <a:bodyPr rtlCol="0" anchor="ctr"/>
+          <a:lstStyle/>
+          <a:p>
+            <a:pPr algn="ctr"/>
+            <a:endParaRPr lang="en-US" sz="1600" dirty="0" smtClean="0"/>
+          </a:p>
+          <a:p>
+            <a:pPr algn="ctr"/>
+            <a:endParaRPr lang="en-US" sz="1600" dirty="0"/>
+          </a:p>
+          <a:p>
+            <a:pPr algn="ctr"/>
+            <a:endParaRPr lang="en-US" sz="1600" dirty="0" smtClean="0"/>
+          </a:p>
+          <a:p>
+            <a:pPr algn="ctr"/>
+            <a:r>
+              <a:rPr lang="en-US" sz="1600" dirty="0" smtClean="0"/>
+              <a:t>30 Rock</a:t>
+            </a:r>
+            <a:endParaRPr lang="en-US" sz="1600" dirty="0"/>
+          </a:p>
+        </p:txBody>
+      </p:sp>
+      <p:sp>
+        <p:nvSpPr>
+          <p:cNvPr id="108" name="Rounded Rectangle 107"/>
+          <p:cNvSpPr/>
+          <p:nvPr/>
+        </p:nvSpPr>
+        <p:spPr>
+          <a:xfrm>
+            <a:off x="1085986" y="3236753"/>
+            <a:ext cx="1778000" cy="1009812"/>
+          </a:xfrm>
+          <a:prstGeom prst="roundRect">
+            <a:avLst/>
+          </a:prstGeom>
+        </p:spPr>
+        <p:style>
+          <a:lnRef idx="2">
+            <a:schemeClr val="accent5"/>
+          </a:lnRef>
+          <a:fillRef idx="1">
+            <a:schemeClr val="lt1"/>
+          </a:fillRef>
+          <a:effectRef idx="0">
+            <a:schemeClr val="accent5"/>
+          </a:effectRef>
+          <a:fontRef idx="minor">
+            <a:schemeClr val="dk1"/>
+          </a:fontRef>
+        </p:style>
+        <p:txBody>
+          <a:bodyPr rtlCol="0" anchor="ctr"/>
+          <a:lstStyle/>
+          <a:p>
+            <a:pPr algn="ctr"/>
+            <a:endParaRPr lang="en-US" sz="1600" dirty="0"/>
+          </a:p>
+          <a:p>
+            <a:pPr algn="ctr"/>
+            <a:endParaRPr lang="en-US" sz="1600" dirty="0" smtClean="0"/>
+          </a:p>
+          <a:p>
+            <a:pPr algn="ctr"/>
+            <a:endParaRPr lang="en-US" sz="1600" dirty="0"/>
+          </a:p>
+          <a:p>
+            <a:pPr algn="ctr"/>
+            <a:r>
+              <a:rPr lang="en-US" sz="1600" dirty="0" smtClean="0"/>
+              <a:t>Glee</a:t>
+            </a:r>
+          </a:p>
+        </p:txBody>
+      </p:sp>
+      <p:sp>
+        <p:nvSpPr>
+          <p:cNvPr id="109" name="Rounded Rectangle 108"/>
+          <p:cNvSpPr/>
+          <p:nvPr/>
+        </p:nvSpPr>
+        <p:spPr>
+          <a:xfrm>
+            <a:off x="6211035" y="1751490"/>
+            <a:ext cx="1778000" cy="1009812"/>
+          </a:xfrm>
+          <a:prstGeom prst="roundRect">
+            <a:avLst/>
+          </a:prstGeom>
+        </p:spPr>
+        <p:style>
+          <a:lnRef idx="2">
+            <a:schemeClr val="accent5"/>
+          </a:lnRef>
+          <a:fillRef idx="1">
+            <a:schemeClr val="lt1"/>
+          </a:fillRef>
+          <a:effectRef idx="0">
+            <a:schemeClr val="accent5"/>
+          </a:effectRef>
+          <a:fontRef idx="minor">
+            <a:schemeClr val="dk1"/>
+          </a:fontRef>
+        </p:style>
+        <p:txBody>
+          <a:bodyPr rtlCol="0" anchor="ctr"/>
+          <a:lstStyle/>
+          <a:p>
+            <a:pPr algn="ctr"/>
+            <a:endParaRPr lang="en-US" dirty="0" smtClean="0"/>
+          </a:p>
+          <a:p>
+            <a:pPr algn="ctr"/>
+            <a:endParaRPr lang="en-US" dirty="0"/>
+          </a:p>
+          <a:p>
+            <a:pPr algn="ctr"/>
+            <a:endParaRPr lang="en-US" dirty="0"/>
+          </a:p>
+          <a:p>
+            <a:pPr algn="ctr"/>
+            <a:r>
+              <a:rPr lang="en-US" sz="1400" dirty="0" err="1" smtClean="0"/>
+              <a:t>Kindergarden</a:t>
+            </a:r>
+            <a:r>
+              <a:rPr lang="en-US" sz="1400" dirty="0" smtClean="0"/>
+              <a:t> Cop</a:t>
+            </a:r>
+            <a:endParaRPr lang="en-US" sz="1400" dirty="0"/>
+          </a:p>
+        </p:txBody>
+      </p:sp>
+      <p:sp>
+        <p:nvSpPr>
+          <p:cNvPr id="110" name="Rounded Rectangle 109"/>
+          <p:cNvSpPr/>
+          <p:nvPr/>
+        </p:nvSpPr>
+        <p:spPr>
+          <a:xfrm>
+            <a:off x="6224939" y="3191975"/>
+            <a:ext cx="1778000" cy="1009812"/>
+          </a:xfrm>
+          <a:prstGeom prst="roundRect">
+            <a:avLst/>
+          </a:prstGeom>
+        </p:spPr>
+        <p:style>
+          <a:lnRef idx="2">
+            <a:schemeClr val="accent5"/>
+          </a:lnRef>
+          <a:fillRef idx="1">
+            <a:schemeClr val="lt1"/>
+          </a:fillRef>
+          <a:effectRef idx="0">
+            <a:schemeClr val="accent5"/>
+          </a:effectRef>
+          <a:fontRef idx="minor">
+            <a:schemeClr val="dk1"/>
+          </a:fontRef>
+        </p:style>
+        <p:txBody>
+          <a:bodyPr rtlCol="0" anchor="ctr"/>
+          <a:lstStyle/>
+          <a:p>
+            <a:pPr algn="ctr"/>
+            <a:endParaRPr lang="en-US" dirty="0" smtClean="0"/>
+          </a:p>
+          <a:p>
+            <a:pPr algn="ctr"/>
+            <a:endParaRPr lang="en-US" dirty="0"/>
+          </a:p>
+          <a:p>
+            <a:pPr algn="ctr"/>
+            <a:endParaRPr lang="en-US" dirty="0" smtClean="0"/>
+          </a:p>
+          <a:p>
+            <a:pPr algn="ctr"/>
+            <a:r>
+              <a:rPr lang="en-US" sz="1600" dirty="0" smtClean="0"/>
+              <a:t>Scrubs</a:t>
+            </a:r>
+            <a:endParaRPr lang="en-US" sz="1600" dirty="0"/>
+          </a:p>
+        </p:txBody>
+      </p:sp>
+      <p:sp>
+        <p:nvSpPr>
+          <p:cNvPr id="111" name="Rounded Rectangle 110"/>
+          <p:cNvSpPr/>
+          <p:nvPr/>
+        </p:nvSpPr>
+        <p:spPr>
+          <a:xfrm>
+            <a:off x="3657758" y="3226593"/>
+            <a:ext cx="1778000" cy="1009812"/>
+          </a:xfrm>
+          <a:prstGeom prst="roundRect">
+            <a:avLst/>
+          </a:prstGeom>
+        </p:spPr>
+        <p:style>
+          <a:lnRef idx="2">
+            <a:schemeClr val="accent5"/>
+          </a:lnRef>
+          <a:fillRef idx="1">
+            <a:schemeClr val="lt1"/>
+          </a:fillRef>
+          <a:effectRef idx="0">
+            <a:schemeClr val="accent5"/>
+          </a:effectRef>
+          <a:fontRef idx="minor">
+            <a:schemeClr val="dk1"/>
+          </a:fontRef>
+        </p:style>
+        <p:txBody>
+          <a:bodyPr rtlCol="0" anchor="ctr"/>
+          <a:lstStyle/>
+          <a:p>
+            <a:pPr algn="ctr"/>
+            <a:endParaRPr lang="en-US" sz="1600" dirty="0" smtClean="0"/>
+          </a:p>
+          <a:p>
+            <a:pPr algn="ctr"/>
+            <a:endParaRPr lang="en-US" sz="1600" dirty="0"/>
+          </a:p>
+          <a:p>
+            <a:pPr algn="ctr"/>
+            <a:endParaRPr lang="en-US" sz="1600" dirty="0" smtClean="0"/>
+          </a:p>
+          <a:p>
+            <a:pPr algn="ctr"/>
+            <a:r>
+              <a:rPr lang="en-US" sz="1600" dirty="0" smtClean="0"/>
+              <a:t>The Ring</a:t>
+            </a:r>
+            <a:endParaRPr lang="en-US" sz="1600" dirty="0"/>
+          </a:p>
+        </p:txBody>
+      </p:sp>
       <p:pic>
         <p:nvPicPr>
-          <p:cNvPr id="2" name="Picture 1" descr="i_like_pancakes.jpg"/>
+          <p:cNvPr id="112" name="Picture 111" descr="futurama_510.jpg"/>
           <p:cNvPicPr>
             <a:picLocks noChangeAspect="1"/>
           </p:cNvPicPr>
@@ -5886,536 +5688,6 @@
         </p:blipFill>
         <p:spPr>
           <a:xfrm>
-            <a:off x="632815" y="542151"/>
-            <a:ext cx="7849234" cy="4504247"/>
-          </a:xfrm>
-          <a:prstGeom prst="rect">
-            <a:avLst/>
-          </a:prstGeom>
-        </p:spPr>
-      </p:pic>
-      <p:sp>
-        <p:nvSpPr>
-          <p:cNvPr id="5" name="Rounded Rectangle 4"/>
-          <p:cNvSpPr/>
-          <p:nvPr/>
-        </p:nvSpPr>
-        <p:spPr>
-          <a:xfrm>
-            <a:off x="267517" y="5721239"/>
-            <a:ext cx="8642803" cy="847103"/>
-          </a:xfrm>
-          <a:prstGeom prst="roundRect">
-            <a:avLst/>
-          </a:prstGeom>
-        </p:spPr>
-        <p:style>
-          <a:lnRef idx="2">
-            <a:schemeClr val="accent5"/>
-          </a:lnRef>
-          <a:fillRef idx="1">
-            <a:schemeClr val="lt1"/>
-          </a:fillRef>
-          <a:effectRef idx="0">
-            <a:schemeClr val="accent5"/>
-          </a:effectRef>
-          <a:fontRef idx="minor">
-            <a:schemeClr val="dk1"/>
-          </a:fontRef>
-        </p:style>
-        <p:txBody>
-          <a:bodyPr rtlCol="0" anchor="ctr"/>
-          <a:lstStyle/>
-          <a:p>
-            <a:pPr algn="ctr"/>
-            <a:r>
-              <a:rPr lang="en-US" b="1" dirty="0" smtClean="0">
-                <a:solidFill>
-                  <a:schemeClr val="tx1"/>
-                </a:solidFill>
-              </a:rPr>
-              <a:t>Test 7</a:t>
-            </a:r>
-            <a:r>
-              <a:rPr lang="en-US" dirty="0" smtClean="0">
-                <a:solidFill>
-                  <a:schemeClr val="tx1"/>
-                </a:solidFill>
-              </a:rPr>
-              <a:t>: Go To Home</a:t>
-            </a:r>
-          </a:p>
-        </p:txBody>
-      </p:sp>
-    </p:spTree>
-    <p:extLst>
-      <p:ext uri="{BB962C8B-B14F-4D97-AF65-F5344CB8AC3E}">
-        <p14:creationId xmlns:p14="http://schemas.microsoft.com/office/powerpoint/2010/main" val="3414738069"/>
-      </p:ext>
-    </p:extLst>
-  </p:cSld>
-  <p:clrMapOvr>
-    <a:masterClrMapping/>
-  </p:clrMapOvr>
-  <p:timing>
-    <p:tnLst>
-      <p:par>
-        <p:cTn xmlns:p14="http://schemas.microsoft.com/office/powerpoint/2010/main" id="1" dur="indefinite" restart="never" nodeType="tmRoot"/>
-      </p:par>
-    </p:tnLst>
-  </p:timing>
-</p:sld>
-</file>
-
-<file path=ppt/slides/slide17.xml><?xml version="1.0" encoding="utf-8"?>
-<p:sld xmlns:a="http://schemas.openxmlformats.org/drawingml/2006/main" xmlns:r="http://schemas.openxmlformats.org/officeDocument/2006/relationships" xmlns:p="http://schemas.openxmlformats.org/presentationml/2006/main">
-  <p:cSld>
-    <p:spTree>
-      <p:nvGrpSpPr>
-        <p:cNvPr id="1" name=""/>
-        <p:cNvGrpSpPr/>
-        <p:nvPr/>
-      </p:nvGrpSpPr>
-      <p:grpSpPr>
-        <a:xfrm>
-          <a:off x="0" y="0"/>
-          <a:ext cx="0" cy="0"/>
-          <a:chOff x="0" y="0"/>
-          <a:chExt cx="0" cy="0"/>
-        </a:xfrm>
-      </p:grpSpPr>
-      <p:pic>
-        <p:nvPicPr>
-          <p:cNvPr id="4" name="Picture 3" descr="TV Background.png"/>
-          <p:cNvPicPr>
-            <a:picLocks noChangeAspect="1"/>
-          </p:cNvPicPr>
-          <p:nvPr/>
-        </p:nvPicPr>
-        <p:blipFill>
-          <a:blip r:embed="rId2">
-            <a:extLst>
-              <a:ext uri="{28A0092B-C50C-407E-A947-70E740481C1C}">
-                <a14:useLocalDpi xmlns:a14="http://schemas.microsoft.com/office/drawing/2010/main" val="0"/>
-              </a:ext>
-            </a:extLst>
-          </a:blip>
-          <a:stretch>
-            <a:fillRect/>
-          </a:stretch>
-        </p:blipFill>
-        <p:spPr>
-          <a:xfrm>
-            <a:off x="0" y="0"/>
-            <a:ext cx="9144000" cy="6858000"/>
-          </a:xfrm>
-          <a:prstGeom prst="rect">
-            <a:avLst/>
-          </a:prstGeom>
-        </p:spPr>
-      </p:pic>
-      <p:sp>
-        <p:nvSpPr>
-          <p:cNvPr id="2" name="Rounded Rectangle 1"/>
-          <p:cNvSpPr/>
-          <p:nvPr/>
-        </p:nvSpPr>
-        <p:spPr>
-          <a:xfrm>
-            <a:off x="267517" y="5721239"/>
-            <a:ext cx="8642803" cy="847103"/>
-          </a:xfrm>
-          <a:prstGeom prst="roundRect">
-            <a:avLst/>
-          </a:prstGeom>
-        </p:spPr>
-        <p:style>
-          <a:lnRef idx="2">
-            <a:schemeClr val="accent5"/>
-          </a:lnRef>
-          <a:fillRef idx="1">
-            <a:schemeClr val="lt1"/>
-          </a:fillRef>
-          <a:effectRef idx="0">
-            <a:schemeClr val="accent5"/>
-          </a:effectRef>
-          <a:fontRef idx="minor">
-            <a:schemeClr val="dk1"/>
-          </a:fontRef>
-        </p:style>
-        <p:txBody>
-          <a:bodyPr rtlCol="0" anchor="ctr"/>
-          <a:lstStyle/>
-          <a:p>
-            <a:pPr algn="ctr"/>
-            <a:r>
-              <a:rPr lang="en-US" b="1" dirty="0" smtClean="0">
-                <a:solidFill>
-                  <a:schemeClr val="tx1"/>
-                </a:solidFill>
-              </a:rPr>
-              <a:t>Highlight</a:t>
-            </a:r>
-            <a:r>
-              <a:rPr lang="en-US" dirty="0" smtClean="0">
-                <a:solidFill>
-                  <a:schemeClr val="tx1"/>
-                </a:solidFill>
-              </a:rPr>
-              <a:t>: Move your arm and the highlighted show/movie will change</a:t>
-            </a:r>
-          </a:p>
-        </p:txBody>
-      </p:sp>
-      <p:sp>
-        <p:nvSpPr>
-          <p:cNvPr id="106" name="Rounded Rectangle 105"/>
-          <p:cNvSpPr/>
-          <p:nvPr/>
-        </p:nvSpPr>
-        <p:spPr>
-          <a:xfrm>
-            <a:off x="1076471" y="1769591"/>
-            <a:ext cx="1778000" cy="1009812"/>
-          </a:xfrm>
-          <a:prstGeom prst="roundRect">
-            <a:avLst/>
-          </a:prstGeom>
-        </p:spPr>
-        <p:style>
-          <a:lnRef idx="2">
-            <a:schemeClr val="accent5"/>
-          </a:lnRef>
-          <a:fillRef idx="1">
-            <a:schemeClr val="lt1"/>
-          </a:fillRef>
-          <a:effectRef idx="0">
-            <a:schemeClr val="accent5"/>
-          </a:effectRef>
-          <a:fontRef idx="minor">
-            <a:schemeClr val="dk1"/>
-          </a:fontRef>
-        </p:style>
-        <p:txBody>
-          <a:bodyPr rtlCol="0" anchor="ctr"/>
-          <a:lstStyle/>
-          <a:p>
-            <a:pPr algn="ctr"/>
-            <a:endParaRPr lang="en-US" sz="1600" dirty="0" smtClean="0"/>
-          </a:p>
-          <a:p>
-            <a:pPr algn="ctr"/>
-            <a:endParaRPr lang="en-US" sz="1600" dirty="0"/>
-          </a:p>
-          <a:p>
-            <a:pPr algn="ctr"/>
-            <a:endParaRPr lang="en-US" sz="1600" dirty="0" smtClean="0"/>
-          </a:p>
-          <a:p>
-            <a:pPr algn="ctr"/>
-            <a:r>
-              <a:rPr lang="en-US" sz="1600" dirty="0" err="1" smtClean="0"/>
-              <a:t>Futurama</a:t>
-            </a:r>
-            <a:endParaRPr lang="en-US" sz="1600" dirty="0"/>
-          </a:p>
-        </p:txBody>
-      </p:sp>
-      <p:sp>
-        <p:nvSpPr>
-          <p:cNvPr id="107" name="Rounded Rectangle 106"/>
-          <p:cNvSpPr/>
-          <p:nvPr/>
-        </p:nvSpPr>
-        <p:spPr>
-          <a:xfrm>
-            <a:off x="3657758" y="1755753"/>
-            <a:ext cx="1778000" cy="1009812"/>
-          </a:xfrm>
-          <a:prstGeom prst="roundRect">
-            <a:avLst/>
-          </a:prstGeom>
-        </p:spPr>
-        <p:style>
-          <a:lnRef idx="2">
-            <a:schemeClr val="accent5"/>
-          </a:lnRef>
-          <a:fillRef idx="1">
-            <a:schemeClr val="lt1"/>
-          </a:fillRef>
-          <a:effectRef idx="0">
-            <a:schemeClr val="accent5"/>
-          </a:effectRef>
-          <a:fontRef idx="minor">
-            <a:schemeClr val="dk1"/>
-          </a:fontRef>
-        </p:style>
-        <p:txBody>
-          <a:bodyPr rtlCol="0" anchor="ctr"/>
-          <a:lstStyle/>
-          <a:p>
-            <a:pPr algn="ctr"/>
-            <a:endParaRPr lang="en-US" sz="1600" dirty="0" smtClean="0"/>
-          </a:p>
-          <a:p>
-            <a:pPr algn="ctr"/>
-            <a:endParaRPr lang="en-US" sz="1600" dirty="0"/>
-          </a:p>
-          <a:p>
-            <a:pPr algn="ctr"/>
-            <a:endParaRPr lang="en-US" sz="1600" dirty="0" smtClean="0"/>
-          </a:p>
-          <a:p>
-            <a:pPr algn="ctr"/>
-            <a:r>
-              <a:rPr lang="en-US" sz="1600" dirty="0" smtClean="0"/>
-              <a:t>30 Rock</a:t>
-            </a:r>
-            <a:endParaRPr lang="en-US" sz="1600" dirty="0"/>
-          </a:p>
-        </p:txBody>
-      </p:sp>
-      <p:sp>
-        <p:nvSpPr>
-          <p:cNvPr id="108" name="Rounded Rectangle 107"/>
-          <p:cNvSpPr/>
-          <p:nvPr/>
-        </p:nvSpPr>
-        <p:spPr>
-          <a:xfrm>
-            <a:off x="1085986" y="3236753"/>
-            <a:ext cx="1778000" cy="1009812"/>
-          </a:xfrm>
-          <a:prstGeom prst="roundRect">
-            <a:avLst/>
-          </a:prstGeom>
-        </p:spPr>
-        <p:style>
-          <a:lnRef idx="2">
-            <a:schemeClr val="accent5"/>
-          </a:lnRef>
-          <a:fillRef idx="1">
-            <a:schemeClr val="lt1"/>
-          </a:fillRef>
-          <a:effectRef idx="0">
-            <a:schemeClr val="accent5"/>
-          </a:effectRef>
-          <a:fontRef idx="minor">
-            <a:schemeClr val="dk1"/>
-          </a:fontRef>
-        </p:style>
-        <p:txBody>
-          <a:bodyPr rtlCol="0" anchor="ctr"/>
-          <a:lstStyle/>
-          <a:p>
-            <a:pPr algn="ctr"/>
-            <a:endParaRPr lang="en-US" sz="1600" dirty="0"/>
-          </a:p>
-          <a:p>
-            <a:pPr algn="ctr"/>
-            <a:endParaRPr lang="en-US" sz="1600" dirty="0" smtClean="0"/>
-          </a:p>
-          <a:p>
-            <a:pPr algn="ctr"/>
-            <a:endParaRPr lang="en-US" sz="1600" dirty="0"/>
-          </a:p>
-          <a:p>
-            <a:pPr algn="ctr"/>
-            <a:r>
-              <a:rPr lang="en-US" sz="1600" dirty="0" smtClean="0"/>
-              <a:t>Glee</a:t>
-            </a:r>
-          </a:p>
-        </p:txBody>
-      </p:sp>
-      <p:sp>
-        <p:nvSpPr>
-          <p:cNvPr id="109" name="Rounded Rectangle 108"/>
-          <p:cNvSpPr/>
-          <p:nvPr/>
-        </p:nvSpPr>
-        <p:spPr>
-          <a:xfrm>
-            <a:off x="6211035" y="1751490"/>
-            <a:ext cx="1778000" cy="1009812"/>
-          </a:xfrm>
-          <a:prstGeom prst="roundRect">
-            <a:avLst/>
-          </a:prstGeom>
-        </p:spPr>
-        <p:style>
-          <a:lnRef idx="2">
-            <a:schemeClr val="accent5"/>
-          </a:lnRef>
-          <a:fillRef idx="1">
-            <a:schemeClr val="lt1"/>
-          </a:fillRef>
-          <a:effectRef idx="0">
-            <a:schemeClr val="accent5"/>
-          </a:effectRef>
-          <a:fontRef idx="minor">
-            <a:schemeClr val="dk1"/>
-          </a:fontRef>
-        </p:style>
-        <p:txBody>
-          <a:bodyPr rtlCol="0" anchor="ctr"/>
-          <a:lstStyle/>
-          <a:p>
-            <a:pPr algn="ctr"/>
-            <a:endParaRPr lang="en-US" dirty="0" smtClean="0"/>
-          </a:p>
-          <a:p>
-            <a:pPr algn="ctr"/>
-            <a:endParaRPr lang="en-US" dirty="0"/>
-          </a:p>
-          <a:p>
-            <a:pPr algn="ctr"/>
-            <a:endParaRPr lang="en-US" dirty="0"/>
-          </a:p>
-          <a:p>
-            <a:pPr algn="ctr"/>
-            <a:r>
-              <a:rPr lang="en-US" sz="1400" dirty="0" err="1" smtClean="0"/>
-              <a:t>Kindergarden</a:t>
-            </a:r>
-            <a:r>
-              <a:rPr lang="en-US" sz="1400" dirty="0" smtClean="0"/>
-              <a:t> Cop</a:t>
-            </a:r>
-            <a:endParaRPr lang="en-US" sz="1400" dirty="0"/>
-          </a:p>
-        </p:txBody>
-      </p:sp>
-      <p:sp>
-        <p:nvSpPr>
-          <p:cNvPr id="110" name="Rounded Rectangle 109"/>
-          <p:cNvSpPr/>
-          <p:nvPr/>
-        </p:nvSpPr>
-        <p:spPr>
-          <a:xfrm>
-            <a:off x="6224939" y="3191975"/>
-            <a:ext cx="1778000" cy="1009812"/>
-          </a:xfrm>
-          <a:prstGeom prst="roundRect">
-            <a:avLst/>
-          </a:prstGeom>
-        </p:spPr>
-        <p:style>
-          <a:lnRef idx="2">
-            <a:schemeClr val="accent5"/>
-          </a:lnRef>
-          <a:fillRef idx="1">
-            <a:schemeClr val="lt1"/>
-          </a:fillRef>
-          <a:effectRef idx="0">
-            <a:schemeClr val="accent5"/>
-          </a:effectRef>
-          <a:fontRef idx="minor">
-            <a:schemeClr val="dk1"/>
-          </a:fontRef>
-        </p:style>
-        <p:txBody>
-          <a:bodyPr rtlCol="0" anchor="ctr"/>
-          <a:lstStyle/>
-          <a:p>
-            <a:pPr algn="ctr"/>
-            <a:endParaRPr lang="en-US" dirty="0" smtClean="0"/>
-          </a:p>
-          <a:p>
-            <a:pPr algn="ctr"/>
-            <a:endParaRPr lang="en-US" dirty="0"/>
-          </a:p>
-          <a:p>
-            <a:pPr algn="ctr"/>
-            <a:endParaRPr lang="en-US" dirty="0" smtClean="0"/>
-          </a:p>
-          <a:p>
-            <a:pPr algn="ctr"/>
-            <a:r>
-              <a:rPr lang="en-US" sz="1600" dirty="0" smtClean="0"/>
-              <a:t>Scrubs</a:t>
-            </a:r>
-            <a:endParaRPr lang="en-US" sz="1600" dirty="0"/>
-          </a:p>
-        </p:txBody>
-      </p:sp>
-      <p:sp>
-        <p:nvSpPr>
-          <p:cNvPr id="111" name="Rounded Rectangle 110"/>
-          <p:cNvSpPr/>
-          <p:nvPr/>
-        </p:nvSpPr>
-        <p:spPr>
-          <a:xfrm>
-            <a:off x="3657758" y="3226593"/>
-            <a:ext cx="1778000" cy="1009812"/>
-          </a:xfrm>
-          <a:prstGeom prst="roundRect">
-            <a:avLst/>
-          </a:prstGeom>
-        </p:spPr>
-        <p:style>
-          <a:lnRef idx="2">
-            <a:schemeClr val="accent5"/>
-          </a:lnRef>
-          <a:fillRef idx="1">
-            <a:schemeClr val="lt1"/>
-          </a:fillRef>
-          <a:effectRef idx="0">
-            <a:schemeClr val="accent5"/>
-          </a:effectRef>
-          <a:fontRef idx="minor">
-            <a:schemeClr val="dk1"/>
-          </a:fontRef>
-        </p:style>
-        <p:txBody>
-          <a:bodyPr rtlCol="0" anchor="ctr"/>
-          <a:lstStyle/>
-          <a:p>
-            <a:pPr algn="ctr"/>
-            <a:endParaRPr lang="en-US" sz="1600" dirty="0" smtClean="0"/>
-          </a:p>
-          <a:p>
-            <a:pPr algn="ctr"/>
-            <a:endParaRPr lang="en-US" sz="1600" dirty="0"/>
-          </a:p>
-          <a:p>
-            <a:pPr algn="ctr"/>
-            <a:endParaRPr lang="en-US" sz="1600" dirty="0" smtClean="0"/>
-          </a:p>
-          <a:p>
-            <a:pPr algn="ctr"/>
-            <a:r>
-              <a:rPr lang="en-US" sz="1600" dirty="0" smtClean="0"/>
-              <a:t>The Ring</a:t>
-            </a:r>
-            <a:endParaRPr lang="en-US" sz="1600" dirty="0"/>
-          </a:p>
-        </p:txBody>
-      </p:sp>
-      <p:pic>
-        <p:nvPicPr>
-          <p:cNvPr id="112" name="Picture 111" descr="futurama_510.jpg"/>
-          <p:cNvPicPr>
-            <a:picLocks noChangeAspect="1"/>
-          </p:cNvPicPr>
-          <p:nvPr/>
-        </p:nvPicPr>
-        <p:blipFill>
-          <a:blip r:embed="rId3">
-            <a:extLst>
-              <a:ext uri="{28A0092B-C50C-407E-A947-70E740481C1C}">
-                <a14:useLocalDpi xmlns:a14="http://schemas.microsoft.com/office/drawing/2010/main" val="0"/>
-              </a:ext>
-            </a:extLst>
-          </a:blip>
-          <a:stretch>
-            <a:fillRect/>
-          </a:stretch>
-        </p:blipFill>
-        <p:spPr>
-          <a:xfrm>
             <a:off x="1218712" y="1808012"/>
             <a:ext cx="1503032" cy="747870"/>
           </a:xfrm>
@@ -6716,7 +5988,7 @@
   <p:timing>
     <p:tnLst>
       <p:par>
-        <p:cTn xmlns:p14="http://schemas.microsoft.com/office/powerpoint/2010/main" id="1" dur="indefinite" restart="never" nodeType="tmRoot"/>
+        <p:cTn id="1" dur="indefinite" restart="never" nodeType="tmRoot"/>
       </p:par>
     </p:tnLst>
   </p:timing>
@@ -7082,7 +6354,7 @@
   <p:timing>
     <p:tnLst>
       <p:par>
-        <p:cTn xmlns:p14="http://schemas.microsoft.com/office/powerpoint/2010/main" id="1" dur="indefinite" restart="never" nodeType="tmRoot"/>
+        <p:cTn id="1" dur="indefinite" restart="never" nodeType="tmRoot"/>
       </p:par>
     </p:tnLst>
   </p:timing>
@@ -7838,7 +7110,7 @@
   <p:timing>
     <p:tnLst>
       <p:par>
-        <p:cTn xmlns:p14="http://schemas.microsoft.com/office/powerpoint/2010/main" id="1" dur="indefinite" restart="never" nodeType="tmRoot"/>
+        <p:cTn id="1" dur="indefinite" restart="never" nodeType="tmRoot"/>
       </p:par>
     </p:tnLst>
   </p:timing>
@@ -8594,7 +7866,7 @@
   <p:timing>
     <p:tnLst>
       <p:par>
-        <p:cTn xmlns:p14="http://schemas.microsoft.com/office/powerpoint/2010/main" id="1" dur="indefinite" restart="never" nodeType="tmRoot"/>
+        <p:cTn id="1" dur="indefinite" restart="never" nodeType="tmRoot"/>
       </p:par>
     </p:tnLst>
   </p:timing>
@@ -9350,7 +8622,7 @@
   <p:timing>
     <p:tnLst>
       <p:par>
-        <p:cTn xmlns:p14="http://schemas.microsoft.com/office/powerpoint/2010/main" id="1" dur="indefinite" restart="never" nodeType="tmRoot"/>
+        <p:cTn id="1" dur="indefinite" restart="never" nodeType="tmRoot"/>
       </p:par>
     </p:tnLst>
   </p:timing>
@@ -9500,7 +8772,7 @@
   <p:timing>
     <p:tnLst>
       <p:par>
-        <p:cTn xmlns:p14="http://schemas.microsoft.com/office/powerpoint/2010/main" id="1" dur="indefinite" restart="never" nodeType="tmRoot"/>
+        <p:cTn id="1" dur="indefinite" restart="never" nodeType="tmRoot"/>
       </p:par>
     </p:tnLst>
   </p:timing>
@@ -10256,7 +9528,7 @@
   <p:timing>
     <p:tnLst>
       <p:par>
-        <p:cTn xmlns:p14="http://schemas.microsoft.com/office/powerpoint/2010/main" id="1" dur="indefinite" restart="never" nodeType="tmRoot"/>
+        <p:cTn id="1" dur="indefinite" restart="never" nodeType="tmRoot"/>
       </p:par>
     </p:tnLst>
   </p:timing>
@@ -10990,7 +10262,7 @@
   <p:timing>
     <p:tnLst>
       <p:par>
-        <p:cTn xmlns:p14="http://schemas.microsoft.com/office/powerpoint/2010/main" id="1" dur="indefinite" restart="never" nodeType="tmRoot"/>
+        <p:cTn id="1" dur="indefinite" restart="never" nodeType="tmRoot"/>
       </p:par>
     </p:tnLst>
   </p:timing>
@@ -11696,11 +10968,6 @@
               </a:rPr>
               <a:t>: Use the interface to watch Star Trek</a:t>
             </a:r>
-            <a:endParaRPr lang="en-US" dirty="0" smtClean="0">
-              <a:solidFill>
-                <a:schemeClr val="tx1"/>
-              </a:solidFill>
-            </a:endParaRPr>
           </a:p>
         </p:txBody>
       </p:sp>
@@ -11758,7 +11025,7 @@
   <p:timing>
     <p:tnLst>
       <p:par>
-        <p:cTn xmlns:p14="http://schemas.microsoft.com/office/powerpoint/2010/main" id="1" dur="indefinite" restart="never" nodeType="tmRoot"/>
+        <p:cTn id="1" dur="indefinite" restart="never" nodeType="tmRoot"/>
       </p:par>
     </p:tnLst>
   </p:timing>

</xml_diff>